<commit_message>
presentazione 3 quasi finita
ho messo apposto immagini e testi.manca l'ultima slide
</commit_message>
<xml_diff>
--- a/Parte 3/Presentazione TedxTok(parte 3).pptx
+++ b/Parte 3/Presentazione TedxTok(parte 3).pptx
@@ -5,35 +5,36 @@
     <p:sldMasterId id="2147483648" r:id="rId1"/>
   </p:sldMasterIdLst>
   <p:notesMasterIdLst>
-    <p:notesMasterId r:id="rId11"/>
+    <p:notesMasterId r:id="rId12"/>
   </p:notesMasterIdLst>
   <p:sldIdLst>
     <p:sldId id="256" r:id="rId2"/>
-    <p:sldId id="257" r:id="rId3"/>
-    <p:sldId id="258" r:id="rId4"/>
-    <p:sldId id="267" r:id="rId5"/>
-    <p:sldId id="260" r:id="rId6"/>
-    <p:sldId id="266" r:id="rId7"/>
-    <p:sldId id="263" r:id="rId8"/>
-    <p:sldId id="262" r:id="rId9"/>
-    <p:sldId id="264" r:id="rId10"/>
+    <p:sldId id="267" r:id="rId3"/>
+    <p:sldId id="257" r:id="rId4"/>
+    <p:sldId id="258" r:id="rId5"/>
+    <p:sldId id="268" r:id="rId6"/>
+    <p:sldId id="260" r:id="rId7"/>
+    <p:sldId id="266" r:id="rId8"/>
+    <p:sldId id="269" r:id="rId9"/>
+    <p:sldId id="262" r:id="rId10"/>
+    <p:sldId id="264" r:id="rId11"/>
   </p:sldIdLst>
   <p:sldSz cx="12192000" cy="6858000"/>
   <p:notesSz cx="6858000" cy="9144000"/>
   <p:embeddedFontLst>
     <p:embeddedFont>
       <p:font typeface="Lato" panose="020F0502020204030203" pitchFamily="34" charset="0"/>
-      <p:regular r:id="rId12"/>
-      <p:bold r:id="rId13"/>
-      <p:italic r:id="rId14"/>
-      <p:boldItalic r:id="rId15"/>
+      <p:regular r:id="rId13"/>
+      <p:bold r:id="rId14"/>
+      <p:italic r:id="rId15"/>
+      <p:boldItalic r:id="rId16"/>
     </p:embeddedFont>
     <p:embeddedFont>
       <p:font typeface="Montserrat" panose="00000500000000000000" pitchFamily="2" charset="0"/>
-      <p:regular r:id="rId16"/>
-      <p:bold r:id="rId17"/>
-      <p:italic r:id="rId18"/>
-      <p:boldItalic r:id="rId19"/>
+      <p:regular r:id="rId17"/>
+      <p:bold r:id="rId18"/>
+      <p:italic r:id="rId19"/>
+      <p:boldItalic r:id="rId20"/>
     </p:embeddedFont>
   </p:embeddedFontLst>
   <p:defaultTextStyle>
@@ -270,7 +271,7 @@
       <p15:sldGuideLst xmlns:p15="http://schemas.microsoft.com/office/powerpoint/2012/main"/>
     </p:ext>
     <p:ext uri="GoogleSlidesCustomDataVersion2">
-      <go:slidesCustomData xmlns="" xmlns:mc="http://schemas.openxmlformats.org/markup-compatibility/2006" xmlns:mv="urn:schemas-microsoft-com:mac:vml" xmlns:c="http://schemas.openxmlformats.org/drawingml/2006/chart" xmlns:dgm="http://schemas.openxmlformats.org/drawingml/2006/diagram" xmlns:o="urn:schemas-microsoft-com:office:office" xmlns:v="urn:schemas-microsoft-com:vml" xmlns:pvml="urn:schemas-microsoft-com:office:powerpoint" xmlns:com="http://schemas.openxmlformats.org/drawingml/2006/compatibility" xmlns:p14="http://schemas.microsoft.com/office/powerpoint/2010/main" xmlns:p15="http://schemas.microsoft.com/office/powerpoint/2012/main" xmlns:ahyp="http://schemas.microsoft.com/office/drawing/2018/hyperlinkcolor" xmlns:go="http://customooxmlschemas.google.com/" r:id="rId22" roundtripDataSignature="AMtx7mhz1SmdKV2hiuRVC0M0Qv/I3R/bJw=="/>
+      <go:slidesCustomData xmlns:go="http://customooxmlschemas.google.com/" xmlns:ahyp="http://schemas.microsoft.com/office/drawing/2018/hyperlinkcolor" xmlns:p15="http://schemas.microsoft.com/office/powerpoint/2012/main" xmlns:p14="http://schemas.microsoft.com/office/powerpoint/2010/main" xmlns:com="http://schemas.openxmlformats.org/drawingml/2006/compatibility" xmlns:pvml="urn:schemas-microsoft-com:office:powerpoint" xmlns:v="urn:schemas-microsoft-com:vml" xmlns:o="urn:schemas-microsoft-com:office:office" xmlns:dgm="http://schemas.openxmlformats.org/drawingml/2006/diagram" xmlns:c="http://schemas.openxmlformats.org/drawingml/2006/chart" xmlns:mv="urn:schemas-microsoft-com:mac:vml" xmlns:mc="http://schemas.openxmlformats.org/markup-compatibility/2006" xmlns="" r:id="rId22" roundtripDataSignature="AMtx7mhz1SmdKV2hiuRVC0M0Qv/I3R/bJw=="/>
     </p:ext>
   </p:extLst>
 </p:presentation>
@@ -977,12 +978,12 @@
 </p:notes>
 </file>
 
-<file path=ppt/notesSlides/notesSlide2.xml><?xml version="1.0" encoding="utf-8"?>
+<file path=ppt/notesSlides/notesSlide10.xml><?xml version="1.0" encoding="utf-8"?>
 <p:notes xmlns:a="http://schemas.openxmlformats.org/drawingml/2006/main" xmlns:r="http://schemas.openxmlformats.org/officeDocument/2006/relationships" xmlns:p="http://schemas.openxmlformats.org/presentationml/2006/main" showMasterSp="0" showMasterPhAnim="0">
   <p:cSld>
     <p:spTree>
       <p:nvGrpSpPr>
-        <p:cNvPr id="1" name="Shape 143"/>
+        <p:cNvPr id="1" name="Shape 186"/>
         <p:cNvGrpSpPr/>
         <p:nvPr/>
       </p:nvGrpSpPr>
@@ -996,53 +997,7 @@
       </p:grpSpPr>
       <p:sp>
         <p:nvSpPr>
-          <p:cNvPr id="144" name="Google Shape;144;p2:notes"/>
-          <p:cNvSpPr txBox="1">
-            <a:spLocks noGrp="1"/>
-          </p:cNvSpPr>
-          <p:nvPr>
-            <p:ph type="body" idx="1"/>
-          </p:nvPr>
-        </p:nvSpPr>
-        <p:spPr>
-          <a:xfrm>
-            <a:off x="685800" y="4343400"/>
-            <a:ext cx="5486400" cy="4114800"/>
-          </a:xfrm>
-          <a:prstGeom prst="rect">
-            <a:avLst/>
-          </a:prstGeom>
-          <a:noFill/>
-          <a:ln>
-            <a:noFill/>
-          </a:ln>
-        </p:spPr>
-        <p:txBody>
-          <a:bodyPr spcFirstLastPara="1" wrap="square" lIns="91425" tIns="91425" rIns="91425" bIns="91425" anchor="t" anchorCtr="0">
-            <a:noAutofit/>
-          </a:bodyPr>
-          <a:lstStyle/>
-          <a:p>
-            <a:pPr marL="0" lvl="0" indent="0" algn="l" rtl="0">
-              <a:lnSpc>
-                <a:spcPct val="100000"/>
-              </a:lnSpc>
-              <a:spcBef>
-                <a:spcPts val="0"/>
-              </a:spcBef>
-              <a:spcAft>
-                <a:spcPts val="0"/>
-              </a:spcAft>
-              <a:buSzPts val="1100"/>
-              <a:buNone/>
-            </a:pPr>
-            <a:endParaRPr/>
-          </a:p>
-        </p:txBody>
-      </p:sp>
-      <p:sp>
-        <p:nvSpPr>
-          <p:cNvPr id="145" name="Google Shape;145;p2:notes"/>
+          <p:cNvPr id="187" name="Google Shape;187;g2dae90a407d_1_10:notes"/>
           <p:cNvSpPr>
             <a:spLocks noGrp="1" noRot="1" noChangeAspect="1"/>
           </p:cNvSpPr>
@@ -1091,34 +1046,9 @@
           </a:ln>
         </p:spPr>
       </p:sp>
-    </p:spTree>
-  </p:cSld>
-  <p:clrMapOvr>
-    <a:masterClrMapping/>
-  </p:clrMapOvr>
-</p:notes>
-</file>
-
-<file path=ppt/notesSlides/notesSlide3.xml><?xml version="1.0" encoding="utf-8"?>
-<p:notes xmlns:a="http://schemas.openxmlformats.org/drawingml/2006/main" xmlns:r="http://schemas.openxmlformats.org/officeDocument/2006/relationships" xmlns:p="http://schemas.openxmlformats.org/presentationml/2006/main" showMasterSp="0" showMasterPhAnim="0">
-  <p:cSld>
-    <p:spTree>
-      <p:nvGrpSpPr>
-        <p:cNvPr id="1" name="Shape 149"/>
-        <p:cNvGrpSpPr/>
-        <p:nvPr/>
-      </p:nvGrpSpPr>
-      <p:grpSpPr>
-        <a:xfrm>
-          <a:off x="0" y="0"/>
-          <a:ext cx="0" cy="0"/>
-          <a:chOff x="0" y="0"/>
-          <a:chExt cx="0" cy="0"/>
-        </a:xfrm>
-      </p:grpSpPr>
       <p:sp>
         <p:nvSpPr>
-          <p:cNvPr id="150" name="Google Shape;150;p3:notes"/>
+          <p:cNvPr id="188" name="Google Shape;188;g2dae90a407d_1_10:notes"/>
           <p:cNvSpPr txBox="1">
             <a:spLocks noGrp="1"/>
           </p:cNvSpPr>
@@ -1162,57 +1092,6 @@
           </a:p>
         </p:txBody>
       </p:sp>
-      <p:sp>
-        <p:nvSpPr>
-          <p:cNvPr id="151" name="Google Shape;151;p3:notes"/>
-          <p:cNvSpPr>
-            <a:spLocks noGrp="1" noRot="1" noChangeAspect="1"/>
-          </p:cNvSpPr>
-          <p:nvPr>
-            <p:ph type="sldImg" idx="2"/>
-          </p:nvPr>
-        </p:nvSpPr>
-        <p:spPr>
-          <a:xfrm>
-            <a:off x="381000" y="685800"/>
-            <a:ext cx="6096000" cy="3429000"/>
-          </a:xfrm>
-          <a:custGeom>
-            <a:avLst/>
-            <a:gdLst/>
-            <a:ahLst/>
-            <a:cxnLst/>
-            <a:rect l="l" t="t" r="r" b="b"/>
-            <a:pathLst>
-              <a:path w="120000" h="120000" extrusionOk="0">
-                <a:moveTo>
-                  <a:pt x="0" y="0"/>
-                </a:moveTo>
-                <a:lnTo>
-                  <a:pt x="120000" y="0"/>
-                </a:lnTo>
-                <a:lnTo>
-                  <a:pt x="120000" y="120000"/>
-                </a:lnTo>
-                <a:lnTo>
-                  <a:pt x="0" y="120000"/>
-                </a:lnTo>
-                <a:close/>
-              </a:path>
-            </a:pathLst>
-          </a:custGeom>
-          <a:noFill/>
-          <a:ln w="9525" cap="flat" cmpd="sng">
-            <a:solidFill>
-              <a:srgbClr val="000000"/>
-            </a:solidFill>
-            <a:prstDash val="solid"/>
-            <a:round/>
-            <a:headEnd type="none" w="sm" len="sm"/>
-            <a:tailEnd type="none" w="sm" len="sm"/>
-          </a:ln>
-        </p:spPr>
-      </p:sp>
     </p:spTree>
   </p:cSld>
   <p:clrMapOvr>
@@ -1221,7 +1100,7 @@
 </p:notes>
 </file>
 
-<file path=ppt/notesSlides/notesSlide4.xml><?xml version="1.0" encoding="utf-8"?>
+<file path=ppt/notesSlides/notesSlide2.xml><?xml version="1.0" encoding="utf-8"?>
 <p:notes xmlns:a="http://schemas.openxmlformats.org/drawingml/2006/main" xmlns:r="http://schemas.openxmlformats.org/officeDocument/2006/relationships" xmlns:p="http://schemas.openxmlformats.org/presentationml/2006/main" showMasterSp="0" showMasterPhAnim="0">
   <p:cSld>
     <p:spTree>
@@ -1348,12 +1227,12 @@
 </p:notes>
 </file>
 
-<file path=ppt/notesSlides/notesSlide5.xml><?xml version="1.0" encoding="utf-8"?>
+<file path=ppt/notesSlides/notesSlide3.xml><?xml version="1.0" encoding="utf-8"?>
 <p:notes xmlns:a="http://schemas.openxmlformats.org/drawingml/2006/main" xmlns:r="http://schemas.openxmlformats.org/officeDocument/2006/relationships" xmlns:p="http://schemas.openxmlformats.org/presentationml/2006/main" showMasterSp="0" showMasterPhAnim="0">
   <p:cSld>
     <p:spTree>
       <p:nvGrpSpPr>
-        <p:cNvPr id="1" name="Shape 162"/>
+        <p:cNvPr id="1" name="Shape 143"/>
         <p:cNvGrpSpPr/>
         <p:nvPr/>
       </p:nvGrpSpPr>
@@ -1367,7 +1246,7 @@
       </p:grpSpPr>
       <p:sp>
         <p:nvSpPr>
-          <p:cNvPr id="163" name="Google Shape;163;g2dae90a407d_2_2:notes"/>
+          <p:cNvPr id="144" name="Google Shape;144;p2:notes"/>
           <p:cNvSpPr txBox="1">
             <a:spLocks noGrp="1"/>
           </p:cNvSpPr>
@@ -1413,7 +1292,7 @@
       </p:sp>
       <p:sp>
         <p:nvSpPr>
-          <p:cNvPr id="164" name="Google Shape;164;g2dae90a407d_2_2:notes"/>
+          <p:cNvPr id="145" name="Google Shape;145;p2:notes"/>
           <p:cNvSpPr>
             <a:spLocks noGrp="1" noRot="1" noChangeAspect="1"/>
           </p:cNvSpPr>
@@ -1470,12 +1349,12 @@
 </p:notes>
 </file>
 
-<file path=ppt/notesSlides/notesSlide6.xml><?xml version="1.0" encoding="utf-8"?>
+<file path=ppt/notesSlides/notesSlide4.xml><?xml version="1.0" encoding="utf-8"?>
 <p:notes xmlns:a="http://schemas.openxmlformats.org/drawingml/2006/main" xmlns:r="http://schemas.openxmlformats.org/officeDocument/2006/relationships" xmlns:p="http://schemas.openxmlformats.org/presentationml/2006/main" showMasterSp="0" showMasterPhAnim="0">
   <p:cSld>
     <p:spTree>
       <p:nvGrpSpPr>
-        <p:cNvPr id="1" name="Shape 168"/>
+        <p:cNvPr id="1" name="Shape 149"/>
         <p:cNvGrpSpPr/>
         <p:nvPr/>
       </p:nvGrpSpPr>
@@ -1489,7 +1368,7 @@
       </p:grpSpPr>
       <p:sp>
         <p:nvSpPr>
-          <p:cNvPr id="169" name="Google Shape;169;g2dae90a407d_2_7:notes"/>
+          <p:cNvPr id="150" name="Google Shape;150;p3:notes"/>
           <p:cNvSpPr txBox="1">
             <a:spLocks noGrp="1"/>
           </p:cNvSpPr>
@@ -1535,7 +1414,7 @@
       </p:sp>
       <p:sp>
         <p:nvSpPr>
-          <p:cNvPr id="170" name="Google Shape;170;g2dae90a407d_2_7:notes"/>
+          <p:cNvPr id="151" name="Google Shape;151;p3:notes"/>
           <p:cNvSpPr>
             <a:spLocks noGrp="1" noRot="1" noChangeAspect="1"/>
           </p:cNvSpPr>
@@ -1585,11 +1464,6 @@
         </p:spPr>
       </p:sp>
     </p:spTree>
-    <p:extLst>
-      <p:ext uri="{BB962C8B-B14F-4D97-AF65-F5344CB8AC3E}">
-        <p14:creationId xmlns:p14="http://schemas.microsoft.com/office/powerpoint/2010/main" val="3829762989"/>
-      </p:ext>
-    </p:extLst>
   </p:cSld>
   <p:clrMapOvr>
     <a:masterClrMapping/>
@@ -1597,129 +1471,7 @@
 </p:notes>
 </file>
 
-<file path=ppt/notesSlides/notesSlide7.xml><?xml version="1.0" encoding="utf-8"?>
-<p:notes xmlns:a="http://schemas.openxmlformats.org/drawingml/2006/main" xmlns:r="http://schemas.openxmlformats.org/officeDocument/2006/relationships" xmlns:p="http://schemas.openxmlformats.org/presentationml/2006/main" showMasterSp="0" showMasterPhAnim="0">
-  <p:cSld>
-    <p:spTree>
-      <p:nvGrpSpPr>
-        <p:cNvPr id="1" name="Shape 181"/>
-        <p:cNvGrpSpPr/>
-        <p:nvPr/>
-      </p:nvGrpSpPr>
-      <p:grpSpPr>
-        <a:xfrm>
-          <a:off x="0" y="0"/>
-          <a:ext cx="0" cy="0"/>
-          <a:chOff x="0" y="0"/>
-          <a:chExt cx="0" cy="0"/>
-        </a:xfrm>
-      </p:grpSpPr>
-      <p:sp>
-        <p:nvSpPr>
-          <p:cNvPr id="182" name="Google Shape;182;g2dae90a407d_1_5:notes"/>
-          <p:cNvSpPr>
-            <a:spLocks noGrp="1" noRot="1" noChangeAspect="1"/>
-          </p:cNvSpPr>
-          <p:nvPr>
-            <p:ph type="sldImg" idx="2"/>
-          </p:nvPr>
-        </p:nvSpPr>
-        <p:spPr>
-          <a:xfrm>
-            <a:off x="381000" y="685800"/>
-            <a:ext cx="6096000" cy="3429000"/>
-          </a:xfrm>
-          <a:custGeom>
-            <a:avLst/>
-            <a:gdLst/>
-            <a:ahLst/>
-            <a:cxnLst/>
-            <a:rect l="l" t="t" r="r" b="b"/>
-            <a:pathLst>
-              <a:path w="120000" h="120000" extrusionOk="0">
-                <a:moveTo>
-                  <a:pt x="0" y="0"/>
-                </a:moveTo>
-                <a:lnTo>
-                  <a:pt x="120000" y="0"/>
-                </a:lnTo>
-                <a:lnTo>
-                  <a:pt x="120000" y="120000"/>
-                </a:lnTo>
-                <a:lnTo>
-                  <a:pt x="0" y="120000"/>
-                </a:lnTo>
-                <a:close/>
-              </a:path>
-            </a:pathLst>
-          </a:custGeom>
-          <a:noFill/>
-          <a:ln w="9525" cap="flat" cmpd="sng">
-            <a:solidFill>
-              <a:srgbClr val="000000"/>
-            </a:solidFill>
-            <a:prstDash val="solid"/>
-            <a:round/>
-            <a:headEnd type="none" w="sm" len="sm"/>
-            <a:tailEnd type="none" w="sm" len="sm"/>
-          </a:ln>
-        </p:spPr>
-      </p:sp>
-      <p:sp>
-        <p:nvSpPr>
-          <p:cNvPr id="183" name="Google Shape;183;g2dae90a407d_1_5:notes"/>
-          <p:cNvSpPr txBox="1">
-            <a:spLocks noGrp="1"/>
-          </p:cNvSpPr>
-          <p:nvPr>
-            <p:ph type="body" idx="1"/>
-          </p:nvPr>
-        </p:nvSpPr>
-        <p:spPr>
-          <a:xfrm>
-            <a:off x="685800" y="4343400"/>
-            <a:ext cx="5486400" cy="4114800"/>
-          </a:xfrm>
-          <a:prstGeom prst="rect">
-            <a:avLst/>
-          </a:prstGeom>
-          <a:noFill/>
-          <a:ln>
-            <a:noFill/>
-          </a:ln>
-        </p:spPr>
-        <p:txBody>
-          <a:bodyPr spcFirstLastPara="1" wrap="square" lIns="91425" tIns="91425" rIns="91425" bIns="91425" anchor="t" anchorCtr="0">
-            <a:noAutofit/>
-          </a:bodyPr>
-          <a:lstStyle/>
-          <a:p>
-            <a:pPr marL="0" lvl="0" indent="0" algn="l" rtl="0">
-              <a:lnSpc>
-                <a:spcPct val="100000"/>
-              </a:lnSpc>
-              <a:spcBef>
-                <a:spcPts val="0"/>
-              </a:spcBef>
-              <a:spcAft>
-                <a:spcPts val="0"/>
-              </a:spcAft>
-              <a:buSzPts val="1100"/>
-              <a:buNone/>
-            </a:pPr>
-            <a:endParaRPr/>
-          </a:p>
-        </p:txBody>
-      </p:sp>
-    </p:spTree>
-  </p:cSld>
-  <p:clrMapOvr>
-    <a:masterClrMapping/>
-  </p:clrMapOvr>
-</p:notes>
-</file>
-
-<file path=ppt/notesSlides/notesSlide8.xml><?xml version="1.0" encoding="utf-8"?>
+<file path=ppt/notesSlides/notesSlide5.xml><?xml version="1.0" encoding="utf-8"?>
 <p:notes xmlns:a="http://schemas.openxmlformats.org/drawingml/2006/main" xmlns:r="http://schemas.openxmlformats.org/officeDocument/2006/relationships" xmlns:p="http://schemas.openxmlformats.org/presentationml/2006/main" showMasterSp="0" showMasterPhAnim="0">
   <p:cSld>
     <p:spTree>
@@ -1834,6 +1586,11 @@
         </p:txBody>
       </p:sp>
     </p:spTree>
+    <p:extLst>
+      <p:ext uri="{BB962C8B-B14F-4D97-AF65-F5344CB8AC3E}">
+        <p14:creationId xmlns:p14="http://schemas.microsoft.com/office/powerpoint/2010/main" val="3582275665"/>
+      </p:ext>
+    </p:extLst>
   </p:cSld>
   <p:clrMapOvr>
     <a:masterClrMapping/>
@@ -1841,12 +1598,12 @@
 </p:notes>
 </file>
 
-<file path=ppt/notesSlides/notesSlide9.xml><?xml version="1.0" encoding="utf-8"?>
+<file path=ppt/notesSlides/notesSlide6.xml><?xml version="1.0" encoding="utf-8"?>
 <p:notes xmlns:a="http://schemas.openxmlformats.org/drawingml/2006/main" xmlns:r="http://schemas.openxmlformats.org/officeDocument/2006/relationships" xmlns:p="http://schemas.openxmlformats.org/presentationml/2006/main" showMasterSp="0" showMasterPhAnim="0">
   <p:cSld>
     <p:spTree>
       <p:nvGrpSpPr>
-        <p:cNvPr id="1" name="Shape 186"/>
+        <p:cNvPr id="1" name="Shape 162"/>
         <p:cNvGrpSpPr/>
         <p:nvPr/>
       </p:nvGrpSpPr>
@@ -1860,7 +1617,383 @@
       </p:grpSpPr>
       <p:sp>
         <p:nvSpPr>
-          <p:cNvPr id="187" name="Google Shape;187;g2dae90a407d_1_10:notes"/>
+          <p:cNvPr id="163" name="Google Shape;163;g2dae90a407d_2_2:notes"/>
+          <p:cNvSpPr txBox="1">
+            <a:spLocks noGrp="1"/>
+          </p:cNvSpPr>
+          <p:nvPr>
+            <p:ph type="body" idx="1"/>
+          </p:nvPr>
+        </p:nvSpPr>
+        <p:spPr>
+          <a:xfrm>
+            <a:off x="685800" y="4343400"/>
+            <a:ext cx="5486400" cy="4114800"/>
+          </a:xfrm>
+          <a:prstGeom prst="rect">
+            <a:avLst/>
+          </a:prstGeom>
+          <a:noFill/>
+          <a:ln>
+            <a:noFill/>
+          </a:ln>
+        </p:spPr>
+        <p:txBody>
+          <a:bodyPr spcFirstLastPara="1" wrap="square" lIns="91425" tIns="91425" rIns="91425" bIns="91425" anchor="t" anchorCtr="0">
+            <a:noAutofit/>
+          </a:bodyPr>
+          <a:lstStyle/>
+          <a:p>
+            <a:pPr marL="0" lvl="0" indent="0" algn="l" rtl="0">
+              <a:lnSpc>
+                <a:spcPct val="100000"/>
+              </a:lnSpc>
+              <a:spcBef>
+                <a:spcPts val="0"/>
+              </a:spcBef>
+              <a:spcAft>
+                <a:spcPts val="0"/>
+              </a:spcAft>
+              <a:buSzPts val="1100"/>
+              <a:buNone/>
+            </a:pPr>
+            <a:endParaRPr/>
+          </a:p>
+        </p:txBody>
+      </p:sp>
+      <p:sp>
+        <p:nvSpPr>
+          <p:cNvPr id="164" name="Google Shape;164;g2dae90a407d_2_2:notes"/>
+          <p:cNvSpPr>
+            <a:spLocks noGrp="1" noRot="1" noChangeAspect="1"/>
+          </p:cNvSpPr>
+          <p:nvPr>
+            <p:ph type="sldImg" idx="2"/>
+          </p:nvPr>
+        </p:nvSpPr>
+        <p:spPr>
+          <a:xfrm>
+            <a:off x="381000" y="685800"/>
+            <a:ext cx="6096000" cy="3429000"/>
+          </a:xfrm>
+          <a:custGeom>
+            <a:avLst/>
+            <a:gdLst/>
+            <a:ahLst/>
+            <a:cxnLst/>
+            <a:rect l="l" t="t" r="r" b="b"/>
+            <a:pathLst>
+              <a:path w="120000" h="120000" extrusionOk="0">
+                <a:moveTo>
+                  <a:pt x="0" y="0"/>
+                </a:moveTo>
+                <a:lnTo>
+                  <a:pt x="120000" y="0"/>
+                </a:lnTo>
+                <a:lnTo>
+                  <a:pt x="120000" y="120000"/>
+                </a:lnTo>
+                <a:lnTo>
+                  <a:pt x="0" y="120000"/>
+                </a:lnTo>
+                <a:close/>
+              </a:path>
+            </a:pathLst>
+          </a:custGeom>
+          <a:noFill/>
+          <a:ln w="9525" cap="flat" cmpd="sng">
+            <a:solidFill>
+              <a:srgbClr val="000000"/>
+            </a:solidFill>
+            <a:prstDash val="solid"/>
+            <a:round/>
+            <a:headEnd type="none" w="sm" len="sm"/>
+            <a:tailEnd type="none" w="sm" len="sm"/>
+          </a:ln>
+        </p:spPr>
+      </p:sp>
+    </p:spTree>
+  </p:cSld>
+  <p:clrMapOvr>
+    <a:masterClrMapping/>
+  </p:clrMapOvr>
+</p:notes>
+</file>
+
+<file path=ppt/notesSlides/notesSlide7.xml><?xml version="1.0" encoding="utf-8"?>
+<p:notes xmlns:a="http://schemas.openxmlformats.org/drawingml/2006/main" xmlns:r="http://schemas.openxmlformats.org/officeDocument/2006/relationships" xmlns:p="http://schemas.openxmlformats.org/presentationml/2006/main" showMasterSp="0" showMasterPhAnim="0">
+  <p:cSld>
+    <p:spTree>
+      <p:nvGrpSpPr>
+        <p:cNvPr id="1" name="Shape 168"/>
+        <p:cNvGrpSpPr/>
+        <p:nvPr/>
+      </p:nvGrpSpPr>
+      <p:grpSpPr>
+        <a:xfrm>
+          <a:off x="0" y="0"/>
+          <a:ext cx="0" cy="0"/>
+          <a:chOff x="0" y="0"/>
+          <a:chExt cx="0" cy="0"/>
+        </a:xfrm>
+      </p:grpSpPr>
+      <p:sp>
+        <p:nvSpPr>
+          <p:cNvPr id="169" name="Google Shape;169;g2dae90a407d_2_7:notes"/>
+          <p:cNvSpPr txBox="1">
+            <a:spLocks noGrp="1"/>
+          </p:cNvSpPr>
+          <p:nvPr>
+            <p:ph type="body" idx="1"/>
+          </p:nvPr>
+        </p:nvSpPr>
+        <p:spPr>
+          <a:xfrm>
+            <a:off x="685800" y="4343400"/>
+            <a:ext cx="5486400" cy="4114800"/>
+          </a:xfrm>
+          <a:prstGeom prst="rect">
+            <a:avLst/>
+          </a:prstGeom>
+          <a:noFill/>
+          <a:ln>
+            <a:noFill/>
+          </a:ln>
+        </p:spPr>
+        <p:txBody>
+          <a:bodyPr spcFirstLastPara="1" wrap="square" lIns="91425" tIns="91425" rIns="91425" bIns="91425" anchor="t" anchorCtr="0">
+            <a:noAutofit/>
+          </a:bodyPr>
+          <a:lstStyle/>
+          <a:p>
+            <a:pPr marL="0" lvl="0" indent="0" algn="l" rtl="0">
+              <a:lnSpc>
+                <a:spcPct val="100000"/>
+              </a:lnSpc>
+              <a:spcBef>
+                <a:spcPts val="0"/>
+              </a:spcBef>
+              <a:spcAft>
+                <a:spcPts val="0"/>
+              </a:spcAft>
+              <a:buSzPts val="1100"/>
+              <a:buNone/>
+            </a:pPr>
+            <a:endParaRPr/>
+          </a:p>
+        </p:txBody>
+      </p:sp>
+      <p:sp>
+        <p:nvSpPr>
+          <p:cNvPr id="170" name="Google Shape;170;g2dae90a407d_2_7:notes"/>
+          <p:cNvSpPr>
+            <a:spLocks noGrp="1" noRot="1" noChangeAspect="1"/>
+          </p:cNvSpPr>
+          <p:nvPr>
+            <p:ph type="sldImg" idx="2"/>
+          </p:nvPr>
+        </p:nvSpPr>
+        <p:spPr>
+          <a:xfrm>
+            <a:off x="381000" y="685800"/>
+            <a:ext cx="6096000" cy="3429000"/>
+          </a:xfrm>
+          <a:custGeom>
+            <a:avLst/>
+            <a:gdLst/>
+            <a:ahLst/>
+            <a:cxnLst/>
+            <a:rect l="l" t="t" r="r" b="b"/>
+            <a:pathLst>
+              <a:path w="120000" h="120000" extrusionOk="0">
+                <a:moveTo>
+                  <a:pt x="0" y="0"/>
+                </a:moveTo>
+                <a:lnTo>
+                  <a:pt x="120000" y="0"/>
+                </a:lnTo>
+                <a:lnTo>
+                  <a:pt x="120000" y="120000"/>
+                </a:lnTo>
+                <a:lnTo>
+                  <a:pt x="0" y="120000"/>
+                </a:lnTo>
+                <a:close/>
+              </a:path>
+            </a:pathLst>
+          </a:custGeom>
+          <a:noFill/>
+          <a:ln w="9525" cap="flat" cmpd="sng">
+            <a:solidFill>
+              <a:srgbClr val="000000"/>
+            </a:solidFill>
+            <a:prstDash val="solid"/>
+            <a:round/>
+            <a:headEnd type="none" w="sm" len="sm"/>
+            <a:tailEnd type="none" w="sm" len="sm"/>
+          </a:ln>
+        </p:spPr>
+      </p:sp>
+    </p:spTree>
+    <p:extLst>
+      <p:ext uri="{BB962C8B-B14F-4D97-AF65-F5344CB8AC3E}">
+        <p14:creationId xmlns:p14="http://schemas.microsoft.com/office/powerpoint/2010/main" val="3829762989"/>
+      </p:ext>
+    </p:extLst>
+  </p:cSld>
+  <p:clrMapOvr>
+    <a:masterClrMapping/>
+  </p:clrMapOvr>
+</p:notes>
+</file>
+
+<file path=ppt/notesSlides/notesSlide8.xml><?xml version="1.0" encoding="utf-8"?>
+<p:notes xmlns:a="http://schemas.openxmlformats.org/drawingml/2006/main" xmlns:r="http://schemas.openxmlformats.org/officeDocument/2006/relationships" xmlns:p="http://schemas.openxmlformats.org/presentationml/2006/main" showMasterSp="0" showMasterPhAnim="0">
+  <p:cSld>
+    <p:spTree>
+      <p:nvGrpSpPr>
+        <p:cNvPr id="1" name="Shape 162"/>
+        <p:cNvGrpSpPr/>
+        <p:nvPr/>
+      </p:nvGrpSpPr>
+      <p:grpSpPr>
+        <a:xfrm>
+          <a:off x="0" y="0"/>
+          <a:ext cx="0" cy="0"/>
+          <a:chOff x="0" y="0"/>
+          <a:chExt cx="0" cy="0"/>
+        </a:xfrm>
+      </p:grpSpPr>
+      <p:sp>
+        <p:nvSpPr>
+          <p:cNvPr id="163" name="Google Shape;163;g2dae90a407d_2_2:notes"/>
+          <p:cNvSpPr txBox="1">
+            <a:spLocks noGrp="1"/>
+          </p:cNvSpPr>
+          <p:nvPr>
+            <p:ph type="body" idx="1"/>
+          </p:nvPr>
+        </p:nvSpPr>
+        <p:spPr>
+          <a:xfrm>
+            <a:off x="685800" y="4343400"/>
+            <a:ext cx="5486400" cy="4114800"/>
+          </a:xfrm>
+          <a:prstGeom prst="rect">
+            <a:avLst/>
+          </a:prstGeom>
+          <a:noFill/>
+          <a:ln>
+            <a:noFill/>
+          </a:ln>
+        </p:spPr>
+        <p:txBody>
+          <a:bodyPr spcFirstLastPara="1" wrap="square" lIns="91425" tIns="91425" rIns="91425" bIns="91425" anchor="t" anchorCtr="0">
+            <a:noAutofit/>
+          </a:bodyPr>
+          <a:lstStyle/>
+          <a:p>
+            <a:pPr marL="0" lvl="0" indent="0" algn="l" rtl="0">
+              <a:lnSpc>
+                <a:spcPct val="100000"/>
+              </a:lnSpc>
+              <a:spcBef>
+                <a:spcPts val="0"/>
+              </a:spcBef>
+              <a:spcAft>
+                <a:spcPts val="0"/>
+              </a:spcAft>
+              <a:buSzPts val="1100"/>
+              <a:buNone/>
+            </a:pPr>
+            <a:endParaRPr/>
+          </a:p>
+        </p:txBody>
+      </p:sp>
+      <p:sp>
+        <p:nvSpPr>
+          <p:cNvPr id="164" name="Google Shape;164;g2dae90a407d_2_2:notes"/>
+          <p:cNvSpPr>
+            <a:spLocks noGrp="1" noRot="1" noChangeAspect="1"/>
+          </p:cNvSpPr>
+          <p:nvPr>
+            <p:ph type="sldImg" idx="2"/>
+          </p:nvPr>
+        </p:nvSpPr>
+        <p:spPr>
+          <a:xfrm>
+            <a:off x="381000" y="685800"/>
+            <a:ext cx="6096000" cy="3429000"/>
+          </a:xfrm>
+          <a:custGeom>
+            <a:avLst/>
+            <a:gdLst/>
+            <a:ahLst/>
+            <a:cxnLst/>
+            <a:rect l="l" t="t" r="r" b="b"/>
+            <a:pathLst>
+              <a:path w="120000" h="120000" extrusionOk="0">
+                <a:moveTo>
+                  <a:pt x="0" y="0"/>
+                </a:moveTo>
+                <a:lnTo>
+                  <a:pt x="120000" y="0"/>
+                </a:lnTo>
+                <a:lnTo>
+                  <a:pt x="120000" y="120000"/>
+                </a:lnTo>
+                <a:lnTo>
+                  <a:pt x="0" y="120000"/>
+                </a:lnTo>
+                <a:close/>
+              </a:path>
+            </a:pathLst>
+          </a:custGeom>
+          <a:noFill/>
+          <a:ln w="9525" cap="flat" cmpd="sng">
+            <a:solidFill>
+              <a:srgbClr val="000000"/>
+            </a:solidFill>
+            <a:prstDash val="solid"/>
+            <a:round/>
+            <a:headEnd type="none" w="sm" len="sm"/>
+            <a:tailEnd type="none" w="sm" len="sm"/>
+          </a:ln>
+        </p:spPr>
+      </p:sp>
+    </p:spTree>
+    <p:extLst>
+      <p:ext uri="{BB962C8B-B14F-4D97-AF65-F5344CB8AC3E}">
+        <p14:creationId xmlns:p14="http://schemas.microsoft.com/office/powerpoint/2010/main" val="2976894477"/>
+      </p:ext>
+    </p:extLst>
+  </p:cSld>
+  <p:clrMapOvr>
+    <a:masterClrMapping/>
+  </p:clrMapOvr>
+</p:notes>
+</file>
+
+<file path=ppt/notesSlides/notesSlide9.xml><?xml version="1.0" encoding="utf-8"?>
+<p:notes xmlns:a="http://schemas.openxmlformats.org/drawingml/2006/main" xmlns:r="http://schemas.openxmlformats.org/officeDocument/2006/relationships" xmlns:p="http://schemas.openxmlformats.org/presentationml/2006/main" showMasterSp="0" showMasterPhAnim="0">
+  <p:cSld>
+    <p:spTree>
+      <p:nvGrpSpPr>
+        <p:cNvPr id="1" name="Shape 173"/>
+        <p:cNvGrpSpPr/>
+        <p:nvPr/>
+      </p:nvGrpSpPr>
+      <p:grpSpPr>
+        <a:xfrm>
+          <a:off x="0" y="0"/>
+          <a:ext cx="0" cy="0"/>
+          <a:chOff x="0" y="0"/>
+          <a:chExt cx="0" cy="0"/>
+        </a:xfrm>
+      </p:grpSpPr>
+      <p:sp>
+        <p:nvSpPr>
+          <p:cNvPr id="174" name="Google Shape;174;g2dae90a407d_1_0:notes"/>
           <p:cNvSpPr>
             <a:spLocks noGrp="1" noRot="1" noChangeAspect="1"/>
           </p:cNvSpPr>
@@ -1911,7 +2044,7 @@
       </p:sp>
       <p:sp>
         <p:nvSpPr>
-          <p:cNvPr id="188" name="Google Shape;188;g2dae90a407d_1_10:notes"/>
+          <p:cNvPr id="175" name="Google Shape;175;g2dae90a407d_1_0:notes"/>
           <p:cNvSpPr txBox="1">
             <a:spLocks noGrp="1"/>
           </p:cNvSpPr>
@@ -15410,7 +15543,538 @@
 </p:sld>
 </file>
 
+<file path=ppt/slides/slide10.xml><?xml version="1.0" encoding="utf-8"?>
+<p:sld xmlns:a="http://schemas.openxmlformats.org/drawingml/2006/main" xmlns:r="http://schemas.openxmlformats.org/officeDocument/2006/relationships" xmlns:p="http://schemas.openxmlformats.org/presentationml/2006/main">
+  <p:cSld>
+    <p:spTree>
+      <p:nvGrpSpPr>
+        <p:cNvPr id="1" name="Shape 189"/>
+        <p:cNvGrpSpPr/>
+        <p:nvPr/>
+      </p:nvGrpSpPr>
+      <p:grpSpPr>
+        <a:xfrm>
+          <a:off x="0" y="0"/>
+          <a:ext cx="0" cy="0"/>
+          <a:chOff x="0" y="0"/>
+          <a:chExt cx="0" cy="0"/>
+        </a:xfrm>
+      </p:grpSpPr>
+      <p:sp>
+        <p:nvSpPr>
+          <p:cNvPr id="190" name="Google Shape;190;g2dae90a407d_1_10"/>
+          <p:cNvSpPr txBox="1">
+            <a:spLocks noGrp="1"/>
+          </p:cNvSpPr>
+          <p:nvPr>
+            <p:ph type="body" idx="1"/>
+          </p:nvPr>
+        </p:nvSpPr>
+        <p:spPr>
+          <a:xfrm>
+            <a:off x="3149182" y="4696874"/>
+            <a:ext cx="4887900" cy="723600"/>
+          </a:xfrm>
+          <a:prstGeom prst="rect">
+            <a:avLst/>
+          </a:prstGeom>
+          <a:noFill/>
+          <a:ln>
+            <a:noFill/>
+          </a:ln>
+        </p:spPr>
+        <p:txBody>
+          <a:bodyPr spcFirstLastPara="1" wrap="square" lIns="91425" tIns="45700" rIns="91425" bIns="45700" anchor="t" anchorCtr="0">
+            <a:normAutofit fontScale="92500" lnSpcReduction="20000"/>
+          </a:bodyPr>
+          <a:lstStyle/>
+          <a:p>
+            <a:pPr marL="0" lvl="0" indent="0" algn="l" rtl="0">
+              <a:lnSpc>
+                <a:spcPct val="90000"/>
+              </a:lnSpc>
+              <a:spcBef>
+                <a:spcPts val="1000"/>
+              </a:spcBef>
+              <a:spcAft>
+                <a:spcPts val="1600"/>
+              </a:spcAft>
+              <a:buSzPct val="69498"/>
+              <a:buNone/>
+            </a:pPr>
+            <a:r>
+              <a:rPr lang="it-IT" sz="2800" u="sng" dirty="0">
+                <a:solidFill>
+                  <a:schemeClr val="hlink"/>
+                </a:solidFill>
+                <a:hlinkClick r:id="rId3"/>
+              </a:rPr>
+              <a:t>Board</a:t>
+            </a:r>
+            <a:endParaRPr sz="2800" dirty="0"/>
+          </a:p>
+        </p:txBody>
+      </p:sp>
+      <p:sp>
+        <p:nvSpPr>
+          <p:cNvPr id="2" name="CasellaDiTesto 1">
+            <a:extLst>
+              <a:ext uri="{FF2B5EF4-FFF2-40B4-BE49-F238E27FC236}">
+                <a16:creationId xmlns:a16="http://schemas.microsoft.com/office/drawing/2014/main" id="{D8C7B831-EF17-11E6-E2A4-C2F43845C958}"/>
+              </a:ext>
+            </a:extLst>
+          </p:cNvPr>
+          <p:cNvSpPr txBox="1"/>
+          <p:nvPr/>
+        </p:nvSpPr>
+        <p:spPr>
+          <a:xfrm>
+            <a:off x="7403647" y="4775630"/>
+            <a:ext cx="4066694" cy="830997"/>
+          </a:xfrm>
+          <a:prstGeom prst="rect">
+            <a:avLst/>
+          </a:prstGeom>
+          <a:noFill/>
+        </p:spPr>
+        <p:txBody>
+          <a:bodyPr wrap="square" rtlCol="0">
+            <a:spAutoFit/>
+          </a:bodyPr>
+          <a:lstStyle/>
+          <a:p>
+            <a:r>
+              <a:rPr lang="it-IT" sz="2400" dirty="0">
+                <a:hlinkClick r:id="rId4"/>
+              </a:rPr>
+              <a:t>GitHub</a:t>
+            </a:r>
+            <a:endParaRPr lang="it-IT" sz="2400" dirty="0"/>
+          </a:p>
+          <a:p>
+            <a:endParaRPr lang="it-IT" sz="2400" dirty="0"/>
+          </a:p>
+        </p:txBody>
+      </p:sp>
+      <p:pic>
+        <p:nvPicPr>
+          <p:cNvPr id="4" name="Immagine 3" descr="Immagine che contiene Elementi grafici, Carattere, grafica, logo&#10;&#10;Descrizione generata automaticamente">
+            <a:extLst>
+              <a:ext uri="{FF2B5EF4-FFF2-40B4-BE49-F238E27FC236}">
+                <a16:creationId xmlns:a16="http://schemas.microsoft.com/office/drawing/2014/main" id="{0E02B7BB-040F-4CF9-0232-5E7BB344AE24}"/>
+              </a:ext>
+            </a:extLst>
+          </p:cNvPr>
+          <p:cNvPicPr>
+            <a:picLocks noChangeAspect="1"/>
+          </p:cNvPicPr>
+          <p:nvPr/>
+        </p:nvPicPr>
+        <p:blipFill>
+          <a:blip r:embed="rId5"/>
+          <a:stretch>
+            <a:fillRect/>
+          </a:stretch>
+        </p:blipFill>
+        <p:spPr>
+          <a:xfrm>
+            <a:off x="3184221" y="1293923"/>
+            <a:ext cx="5355703" cy="2994255"/>
+          </a:xfrm>
+          <a:prstGeom prst="rect">
+            <a:avLst/>
+          </a:prstGeom>
+        </p:spPr>
+      </p:pic>
+    </p:spTree>
+  </p:cSld>
+  <p:clrMapOvr>
+    <a:masterClrMapping/>
+  </p:clrMapOvr>
+</p:sld>
+</file>
+
 <file path=ppt/slides/slide2.xml><?xml version="1.0" encoding="utf-8"?>
+<p:sld xmlns:a="http://schemas.openxmlformats.org/drawingml/2006/main" xmlns:r="http://schemas.openxmlformats.org/officeDocument/2006/relationships" xmlns:p="http://schemas.openxmlformats.org/presentationml/2006/main">
+  <p:cSld>
+    <p:spTree>
+      <p:nvGrpSpPr>
+        <p:cNvPr id="1" name="Shape 176"/>
+        <p:cNvGrpSpPr/>
+        <p:nvPr/>
+      </p:nvGrpSpPr>
+      <p:grpSpPr>
+        <a:xfrm>
+          <a:off x="0" y="0"/>
+          <a:ext cx="0" cy="0"/>
+          <a:chOff x="0" y="0"/>
+          <a:chExt cx="0" cy="0"/>
+        </a:xfrm>
+      </p:grpSpPr>
+      <p:sp>
+        <p:nvSpPr>
+          <p:cNvPr id="177" name="Google Shape;177;g2dae90a407d_1_0"/>
+          <p:cNvSpPr txBox="1">
+            <a:spLocks noGrp="1"/>
+          </p:cNvSpPr>
+          <p:nvPr>
+            <p:ph type="title"/>
+          </p:nvPr>
+        </p:nvSpPr>
+        <p:spPr>
+          <a:xfrm>
+            <a:off x="1567325" y="1647435"/>
+            <a:ext cx="4708500" cy="1051800"/>
+          </a:xfrm>
+          <a:prstGeom prst="rect">
+            <a:avLst/>
+          </a:prstGeom>
+          <a:noFill/>
+          <a:ln>
+            <a:noFill/>
+          </a:ln>
+        </p:spPr>
+        <p:txBody>
+          <a:bodyPr spcFirstLastPara="1" wrap="square" lIns="121900" tIns="121900" rIns="121900" bIns="121900" anchor="t" anchorCtr="0">
+            <a:normAutofit/>
+          </a:bodyPr>
+          <a:lstStyle/>
+          <a:p>
+            <a:pPr marL="0" lvl="0" indent="0" algn="ctr" rtl="0">
+              <a:lnSpc>
+                <a:spcPct val="100000"/>
+              </a:lnSpc>
+              <a:spcBef>
+                <a:spcPts val="0"/>
+              </a:spcBef>
+              <a:spcAft>
+                <a:spcPts val="0"/>
+              </a:spcAft>
+              <a:buSzPts val="3200"/>
+              <a:buNone/>
+            </a:pPr>
+            <a:r>
+              <a:rPr lang="it-IT" dirty="0"/>
+              <a:t>UTILIZZO</a:t>
+            </a:r>
+            <a:endParaRPr cap="none" dirty="0"/>
+          </a:p>
+        </p:txBody>
+      </p:sp>
+      <p:sp>
+        <p:nvSpPr>
+          <p:cNvPr id="179" name="Google Shape;179;g2dae90a407d_1_0"/>
+          <p:cNvSpPr txBox="1">
+            <a:spLocks noGrp="1"/>
+          </p:cNvSpPr>
+          <p:nvPr>
+            <p:ph type="title"/>
+          </p:nvPr>
+        </p:nvSpPr>
+        <p:spPr>
+          <a:xfrm>
+            <a:off x="6113150" y="1440885"/>
+            <a:ext cx="5240700" cy="1325700"/>
+          </a:xfrm>
+          <a:prstGeom prst="rect">
+            <a:avLst/>
+          </a:prstGeom>
+          <a:noFill/>
+          <a:ln>
+            <a:noFill/>
+          </a:ln>
+        </p:spPr>
+        <p:txBody>
+          <a:bodyPr spcFirstLastPara="1" wrap="square" lIns="91425" tIns="45700" rIns="91425" bIns="45700" anchor="ctr" anchorCtr="0">
+            <a:normAutofit/>
+          </a:bodyPr>
+          <a:lstStyle/>
+          <a:p>
+            <a:pPr marL="0" lvl="0" indent="0" algn="ctr" rtl="0">
+              <a:lnSpc>
+                <a:spcPct val="90000"/>
+              </a:lnSpc>
+              <a:spcBef>
+                <a:spcPts val="0"/>
+              </a:spcBef>
+              <a:spcAft>
+                <a:spcPts val="0"/>
+              </a:spcAft>
+              <a:buSzPts val="1800"/>
+              <a:buNone/>
+            </a:pPr>
+            <a:r>
+              <a:rPr lang="it-IT" dirty="0"/>
+              <a:t>ESPERIENZA</a:t>
+            </a:r>
+            <a:br>
+              <a:rPr lang="it-IT" dirty="0"/>
+            </a:br>
+            <a:r>
+              <a:rPr lang="it-IT" dirty="0"/>
+              <a:t>UTENTE</a:t>
+            </a:r>
+            <a:endParaRPr dirty="0"/>
+          </a:p>
+        </p:txBody>
+      </p:sp>
+      <p:sp>
+        <p:nvSpPr>
+          <p:cNvPr id="180" name="Google Shape;180;g2dae90a407d_1_0"/>
+          <p:cNvSpPr txBox="1"/>
+          <p:nvPr/>
+        </p:nvSpPr>
+        <p:spPr>
+          <a:xfrm>
+            <a:off x="6645350" y="2788218"/>
+            <a:ext cx="4708500" cy="3483663"/>
+          </a:xfrm>
+          <a:prstGeom prst="rect">
+            <a:avLst/>
+          </a:prstGeom>
+          <a:noFill/>
+          <a:ln>
+            <a:noFill/>
+          </a:ln>
+        </p:spPr>
+        <p:txBody>
+          <a:bodyPr spcFirstLastPara="1" wrap="square" lIns="91425" tIns="91425" rIns="91425" bIns="91425" anchor="t" anchorCtr="0">
+            <a:noAutofit/>
+          </a:bodyPr>
+          <a:lstStyle/>
+          <a:p>
+            <a:pPr marL="285750" lvl="0" indent="-285750" algn="l" rtl="0">
+              <a:spcBef>
+                <a:spcPts val="0"/>
+              </a:spcBef>
+              <a:spcAft>
+                <a:spcPts val="0"/>
+              </a:spcAft>
+              <a:buClr>
+                <a:schemeClr val="bg1"/>
+              </a:buClr>
+              <a:buFont typeface="Arial" panose="020B0604020202020204" pitchFamily="34" charset="0"/>
+              <a:buChar char="•"/>
+            </a:pPr>
+            <a:r>
+              <a:rPr lang="it-IT" sz="2000" dirty="0">
+                <a:solidFill>
+                  <a:schemeClr val="bg1"/>
+                </a:solidFill>
+              </a:rPr>
+              <a:t>Questo permette al nostro utente di avere una chiara comprensione della lista dei video correlati e di scegliere al meglio il video desiderato.</a:t>
+            </a:r>
+          </a:p>
+          <a:p>
+            <a:pPr marL="285750" lvl="0" indent="-285750" algn="l" rtl="0">
+              <a:spcBef>
+                <a:spcPts val="0"/>
+              </a:spcBef>
+              <a:spcAft>
+                <a:spcPts val="0"/>
+              </a:spcAft>
+              <a:buClr>
+                <a:schemeClr val="bg1"/>
+              </a:buClr>
+              <a:buFont typeface="Arial" panose="020B0604020202020204" pitchFamily="34" charset="0"/>
+              <a:buChar char="•"/>
+            </a:pPr>
+            <a:endParaRPr lang="it-IT" sz="1100" u="sng" dirty="0">
+              <a:solidFill>
+                <a:schemeClr val="bg1"/>
+              </a:solidFill>
+              <a:latin typeface="Lato"/>
+              <a:ea typeface="Lato"/>
+              <a:cs typeface="Lato"/>
+              <a:sym typeface="Lato"/>
+            </a:endParaRPr>
+          </a:p>
+        </p:txBody>
+      </p:sp>
+      <p:sp>
+        <p:nvSpPr>
+          <p:cNvPr id="2" name="Google Shape;180;g2dae90a407d_1_0">
+            <a:extLst>
+              <a:ext uri="{FF2B5EF4-FFF2-40B4-BE49-F238E27FC236}">
+                <a16:creationId xmlns:a16="http://schemas.microsoft.com/office/drawing/2014/main" id="{33E79721-41D7-B3EC-7557-B49C56433C25}"/>
+              </a:ext>
+            </a:extLst>
+          </p:cNvPr>
+          <p:cNvSpPr txBox="1"/>
+          <p:nvPr/>
+        </p:nvSpPr>
+        <p:spPr>
+          <a:xfrm>
+            <a:off x="1730000" y="2790199"/>
+            <a:ext cx="4708500" cy="3483663"/>
+          </a:xfrm>
+          <a:prstGeom prst="rect">
+            <a:avLst/>
+          </a:prstGeom>
+          <a:noFill/>
+          <a:ln>
+            <a:noFill/>
+          </a:ln>
+        </p:spPr>
+        <p:txBody>
+          <a:bodyPr spcFirstLastPara="1" wrap="square" lIns="91425" tIns="91425" rIns="91425" bIns="91425" anchor="t" anchorCtr="0">
+            <a:noAutofit/>
+          </a:bodyPr>
+          <a:lstStyle/>
+          <a:p>
+            <a:pPr marL="342900" indent="-342900">
+              <a:buClr>
+                <a:schemeClr val="bg1"/>
+              </a:buClr>
+              <a:buFont typeface="Arial" panose="020B0604020202020204" pitchFamily="34" charset="0"/>
+              <a:buChar char="•"/>
+            </a:pPr>
+            <a:r>
+              <a:rPr lang="it-IT" sz="2000" dirty="0">
+                <a:solidFill>
+                  <a:schemeClr val="bg1"/>
+                </a:solidFill>
+              </a:rPr>
+              <a:t>Questa Lambda </a:t>
+            </a:r>
+            <a:r>
+              <a:rPr lang="it-IT" sz="2000" dirty="0" err="1">
+                <a:solidFill>
+                  <a:schemeClr val="bg1"/>
+                </a:solidFill>
+              </a:rPr>
+              <a:t>Function</a:t>
+            </a:r>
+            <a:r>
+              <a:rPr lang="it-IT" sz="2000" dirty="0">
+                <a:solidFill>
+                  <a:schemeClr val="bg1"/>
+                </a:solidFill>
+              </a:rPr>
+              <a:t> consente di visualizzare tutti i video correlati, dato un ID iniziale di un video, visualizzando i seguenti parametri:</a:t>
+            </a:r>
+          </a:p>
+          <a:p>
+            <a:pPr marL="342900" indent="-342900">
+              <a:buClr>
+                <a:schemeClr val="bg1"/>
+              </a:buClr>
+              <a:buFont typeface="Arial" panose="020B0604020202020204" pitchFamily="34" charset="0"/>
+              <a:buChar char="•"/>
+            </a:pPr>
+            <a:r>
+              <a:rPr lang="it-IT" sz="2000" dirty="0" err="1">
+                <a:solidFill>
+                  <a:schemeClr val="bg1"/>
+                </a:solidFill>
+              </a:rPr>
+              <a:t>Related_video_ids</a:t>
+            </a:r>
+            <a:r>
+              <a:rPr lang="it-IT" sz="2000" dirty="0">
+                <a:solidFill>
+                  <a:schemeClr val="bg1"/>
+                </a:solidFill>
+              </a:rPr>
+              <a:t>, ossia l’ID del video correlato.</a:t>
+            </a:r>
+          </a:p>
+          <a:p>
+            <a:pPr marL="342900" indent="-342900">
+              <a:buClr>
+                <a:schemeClr val="bg1"/>
+              </a:buClr>
+              <a:buFont typeface="Arial" panose="020B0604020202020204" pitchFamily="34" charset="0"/>
+              <a:buChar char="•"/>
+            </a:pPr>
+            <a:r>
+              <a:rPr lang="it-IT" sz="2000" dirty="0" err="1">
+                <a:solidFill>
+                  <a:schemeClr val="bg1"/>
+                </a:solidFill>
+              </a:rPr>
+              <a:t>Related_video_title</a:t>
+            </a:r>
+            <a:r>
+              <a:rPr lang="it-IT" sz="2000" dirty="0">
+                <a:solidFill>
+                  <a:schemeClr val="bg1"/>
+                </a:solidFill>
+              </a:rPr>
+              <a:t>, ossia il titolo del video correlato.</a:t>
+            </a:r>
+          </a:p>
+          <a:p>
+            <a:pPr marL="342900" indent="-342900">
+              <a:buClr>
+                <a:schemeClr val="bg1"/>
+              </a:buClr>
+              <a:buFont typeface="Arial" panose="020B0604020202020204" pitchFamily="34" charset="0"/>
+              <a:buChar char="•"/>
+            </a:pPr>
+            <a:r>
+              <a:rPr lang="it-IT" sz="2000" dirty="0" err="1">
+                <a:solidFill>
+                  <a:schemeClr val="bg1"/>
+                </a:solidFill>
+              </a:rPr>
+              <a:t>Related_presentedBy</a:t>
+            </a:r>
+            <a:r>
+              <a:rPr lang="it-IT" sz="2000" dirty="0">
+                <a:solidFill>
+                  <a:schemeClr val="bg1"/>
+                </a:solidFill>
+              </a:rPr>
+              <a:t>, ossia il presentatore del video.</a:t>
+            </a:r>
+          </a:p>
+        </p:txBody>
+      </p:sp>
+      <p:pic>
+        <p:nvPicPr>
+          <p:cNvPr id="3" name="Immagine 2">
+            <a:extLst>
+              <a:ext uri="{FF2B5EF4-FFF2-40B4-BE49-F238E27FC236}">
+                <a16:creationId xmlns:a16="http://schemas.microsoft.com/office/drawing/2014/main" id="{BA94303D-314E-A9FC-4D03-86DF88AF9BB6}"/>
+              </a:ext>
+            </a:extLst>
+          </p:cNvPr>
+          <p:cNvPicPr>
+            <a:picLocks noChangeAspect="1"/>
+          </p:cNvPicPr>
+          <p:nvPr/>
+        </p:nvPicPr>
+        <p:blipFill>
+          <a:blip r:embed="rId3"/>
+          <a:stretch>
+            <a:fillRect/>
+          </a:stretch>
+        </p:blipFill>
+        <p:spPr>
+          <a:xfrm>
+            <a:off x="1730000" y="232752"/>
+            <a:ext cx="9382557" cy="1347333"/>
+          </a:xfrm>
+          <a:prstGeom prst="rect">
+            <a:avLst/>
+          </a:prstGeom>
+        </p:spPr>
+      </p:pic>
+    </p:spTree>
+    <p:extLst>
+      <p:ext uri="{BB962C8B-B14F-4D97-AF65-F5344CB8AC3E}">
+        <p14:creationId xmlns:p14="http://schemas.microsoft.com/office/powerpoint/2010/main" val="4263137050"/>
+      </p:ext>
+    </p:extLst>
+  </p:cSld>
+  <p:clrMapOvr>
+    <a:masterClrMapping/>
+  </p:clrMapOvr>
+</p:sld>
+</file>
+
+<file path=ppt/slides/slide3.xml><?xml version="1.0" encoding="utf-8"?>
 <p:sld xmlns:a="http://schemas.openxmlformats.org/drawingml/2006/main" xmlns:r="http://schemas.openxmlformats.org/officeDocument/2006/relationships" xmlns:p="http://schemas.openxmlformats.org/presentationml/2006/main">
   <p:cSld>
     <p:spTree>
@@ -15589,7 +16253,7 @@
 </p:sld>
 </file>
 
-<file path=ppt/slides/slide3.xml><?xml version="1.0" encoding="utf-8"?>
+<file path=ppt/slides/slide4.xml><?xml version="1.0" encoding="utf-8"?>
 <p:sld xmlns:a="http://schemas.openxmlformats.org/drawingml/2006/main" xmlns:r="http://schemas.openxmlformats.org/officeDocument/2006/relationships" xmlns:p="http://schemas.openxmlformats.org/presentationml/2006/main">
   <p:cSld>
     <p:spTree>
@@ -15829,7 +16493,7 @@
 </p:sld>
 </file>
 
-<file path=ppt/slides/slide4.xml><?xml version="1.0" encoding="utf-8"?>
+<file path=ppt/slides/slide5.xml><?xml version="1.0" encoding="utf-8"?>
 <p:sld xmlns:a="http://schemas.openxmlformats.org/drawingml/2006/main" xmlns:r="http://schemas.openxmlformats.org/officeDocument/2006/relationships" xmlns:p="http://schemas.openxmlformats.org/presentationml/2006/main">
   <p:cSld>
     <p:spTree>
@@ -15858,7 +16522,7 @@
         </p:nvSpPr>
         <p:spPr>
           <a:xfrm>
-            <a:off x="1712778" y="1647435"/>
+            <a:off x="1567325" y="1647435"/>
             <a:ext cx="4708500" cy="1051800"/>
           </a:xfrm>
           <a:prstGeom prst="rect">
@@ -15961,7 +16625,7 @@
         </p:nvSpPr>
         <p:spPr>
           <a:xfrm>
-            <a:off x="6643450" y="3141585"/>
+            <a:off x="6645350" y="2788218"/>
             <a:ext cx="4708500" cy="3483663"/>
           </a:xfrm>
           <a:prstGeom prst="rect">
@@ -15992,29 +16656,14 @@
               <a:buChar char="•"/>
             </a:pPr>
             <a:r>
-              <a:rPr lang="it-IT" sz="1800" dirty="0">
+              <a:rPr lang="it-IT" sz="2000" dirty="0">
                 <a:solidFill>
                   <a:schemeClr val="bg1"/>
                 </a:solidFill>
               </a:rPr>
-              <a:t>F.</a:t>
+              <a:t>Questo permette al nostro utente, una volta selezionati i tag di suo interesse, di visualizzarli tramite il sistema.</a:t>
             </a:r>
-          </a:p>
-          <a:p>
-            <a:pPr marL="285750" lvl="0" indent="-285750" algn="l" rtl="0">
-              <a:spcBef>
-                <a:spcPts val="0"/>
-              </a:spcBef>
-              <a:spcAft>
-                <a:spcPts val="0"/>
-              </a:spcAft>
-              <a:buClr>
-                <a:schemeClr val="bg1"/>
-              </a:buClr>
-              <a:buFont typeface="Arial" panose="020B0604020202020204" pitchFamily="34" charset="0"/>
-              <a:buChar char="•"/>
-            </a:pPr>
-            <a:endParaRPr lang="it-IT" sz="1100" u="sng" dirty="0">
+            <a:endParaRPr lang="it-IT" sz="1000" u="sng" dirty="0">
               <a:solidFill>
                 <a:schemeClr val="bg1"/>
               </a:solidFill>
@@ -16040,7 +16689,7 @@
         </p:nvSpPr>
         <p:spPr>
           <a:xfrm>
-            <a:off x="1730000" y="3141585"/>
+            <a:off x="1730000" y="2790199"/>
             <a:ext cx="4708500" cy="3483663"/>
           </a:xfrm>
           <a:prstGeom prst="rect">
@@ -16057,13 +16706,7 @@
           </a:bodyPr>
           <a:lstStyle/>
           <a:p>
-            <a:pPr marL="285750" lvl="0" indent="-285750" algn="l" rtl="0">
-              <a:spcBef>
-                <a:spcPts val="0"/>
-              </a:spcBef>
-              <a:spcAft>
-                <a:spcPts val="0"/>
-              </a:spcAft>
+            <a:pPr marL="342900" indent="-342900">
               <a:buClr>
                 <a:schemeClr val="bg1"/>
               </a:buClr>
@@ -16071,54 +16714,120 @@
               <a:buChar char="•"/>
             </a:pPr>
             <a:r>
-              <a:rPr lang="it-IT" sz="1800" u="sng" dirty="0">
+              <a:rPr lang="it-IT" sz="2000" dirty="0">
                 <a:solidFill>
                   <a:schemeClr val="bg1"/>
                 </a:solidFill>
-                <a:latin typeface="Lato"/>
-                <a:ea typeface="Lato"/>
-                <a:cs typeface="Lato"/>
-                <a:sym typeface="Lato"/>
               </a:rPr>
-              <a:t>A</a:t>
+              <a:t>Questa Lambda </a:t>
+            </a:r>
+            <a:r>
+              <a:rPr lang="it-IT" sz="2000" dirty="0" err="1">
+                <a:solidFill>
+                  <a:schemeClr val="bg1"/>
+                </a:solidFill>
+              </a:rPr>
+              <a:t>Function</a:t>
+            </a:r>
+            <a:r>
+              <a:rPr lang="it-IT" sz="2000" dirty="0">
+                <a:solidFill>
+                  <a:schemeClr val="bg1"/>
+                </a:solidFill>
+              </a:rPr>
+              <a:t>, dato un array di tag, restituisce un JSON con tutti i talk corrispondenti a quei tag, ordinati in modo decrescente e senza duplicati.</a:t>
             </a:r>
           </a:p>
         </p:txBody>
       </p:sp>
-      <p:pic>
-        <p:nvPicPr>
-          <p:cNvPr id="3" name="Immagine 2">
+      <p:sp>
+        <p:nvSpPr>
+          <p:cNvPr id="4" name="CasellaDiTesto 3">
             <a:extLst>
               <a:ext uri="{FF2B5EF4-FFF2-40B4-BE49-F238E27FC236}">
-                <a16:creationId xmlns:a16="http://schemas.microsoft.com/office/drawing/2014/main" id="{BA94303D-314E-A9FC-4D03-86DF88AF9BB6}"/>
+                <a16:creationId xmlns:a16="http://schemas.microsoft.com/office/drawing/2014/main" id="{54DCA3A6-E8C2-5DCE-AD99-BD91108B45EC}"/>
               </a:ext>
             </a:extLst>
           </p:cNvPr>
-          <p:cNvPicPr>
-            <a:picLocks noChangeAspect="1"/>
-          </p:cNvPicPr>
+          <p:cNvSpPr txBox="1"/>
           <p:nvPr/>
-        </p:nvPicPr>
-        <p:blipFill>
-          <a:blip r:embed="rId3"/>
-          <a:stretch>
-            <a:fillRect/>
-          </a:stretch>
-        </p:blipFill>
+        </p:nvSpPr>
         <p:spPr>
           <a:xfrm>
-            <a:off x="1730000" y="232752"/>
-            <a:ext cx="9382557" cy="1347333"/>
+            <a:off x="2860272" y="363667"/>
+            <a:ext cx="6831106" cy="1077218"/>
           </a:xfrm>
           <a:prstGeom prst="rect">
             <a:avLst/>
           </a:prstGeom>
+          <a:noFill/>
         </p:spPr>
-      </p:pic>
+        <p:txBody>
+          <a:bodyPr wrap="square" rtlCol="0">
+            <a:spAutoFit/>
+          </a:bodyPr>
+          <a:lstStyle/>
+          <a:p>
+            <a:r>
+              <a:rPr lang="it-IT" sz="3200" dirty="0">
+                <a:solidFill>
+                  <a:schemeClr val="bg1"/>
+                </a:solidFill>
+              </a:rPr>
+              <a:t>Lambda </a:t>
+            </a:r>
+            <a:r>
+              <a:rPr lang="it-IT" sz="3200" dirty="0" err="1">
+                <a:solidFill>
+                  <a:schemeClr val="bg1"/>
+                </a:solidFill>
+              </a:rPr>
+              <a:t>Function</a:t>
+            </a:r>
+            <a:r>
+              <a:rPr lang="it-IT" sz="3200" dirty="0">
+                <a:solidFill>
+                  <a:schemeClr val="bg1"/>
+                </a:solidFill>
+              </a:rPr>
+              <a:t>(</a:t>
+            </a:r>
+            <a:r>
+              <a:rPr lang="it-IT" sz="3200" dirty="0" err="1">
+                <a:solidFill>
+                  <a:schemeClr val="bg1"/>
+                </a:solidFill>
+              </a:rPr>
+              <a:t>TedxTok</a:t>
+            </a:r>
+            <a:r>
+              <a:rPr lang="it-IT" sz="3200" dirty="0">
+                <a:solidFill>
+                  <a:schemeClr val="bg1"/>
+                </a:solidFill>
+              </a:rPr>
+              <a:t>): </a:t>
+            </a:r>
+            <a:r>
+              <a:rPr lang="it-IT" sz="3200" dirty="0" err="1">
+                <a:solidFill>
+                  <a:schemeClr val="bg1"/>
+                </a:solidFill>
+              </a:rPr>
+              <a:t>Get_Talk_List_By_Tags</a:t>
+            </a:r>
+            <a:endParaRPr lang="it-IT" sz="3200" dirty="0">
+              <a:solidFill>
+                <a:schemeClr val="bg1"/>
+              </a:solidFill>
+            </a:endParaRPr>
+          </a:p>
+        </p:txBody>
+      </p:sp>
     </p:spTree>
     <p:extLst>
       <p:ext uri="{BB962C8B-B14F-4D97-AF65-F5344CB8AC3E}">
-        <p14:creationId xmlns:p14="http://schemas.microsoft.com/office/powerpoint/2010/main" val="4263137050"/>
+        <p14:creationId xmlns:p14="http://schemas.microsoft.com/office/powerpoint/2010/main" val="3451386327"/>
       </p:ext>
     </p:extLst>
   </p:cSld>
@@ -16128,7 +16837,7 @@
 </p:sld>
 </file>
 
-<file path=ppt/slides/slide5.xml><?xml version="1.0" encoding="utf-8"?>
+<file path=ppt/slides/slide6.xml><?xml version="1.0" encoding="utf-8"?>
 <p:sld xmlns:a="http://schemas.openxmlformats.org/drawingml/2006/main" xmlns:r="http://schemas.openxmlformats.org/officeDocument/2006/relationships" xmlns:p="http://schemas.openxmlformats.org/presentationml/2006/main">
   <p:cSld>
     <p:spTree>
@@ -16147,82 +16856,179 @@
       </p:grpSpPr>
       <p:sp>
         <p:nvSpPr>
-          <p:cNvPr id="166" name="Google Shape;166;g2dae90a407d_2_2"/>
-          <p:cNvSpPr txBox="1">
-            <a:spLocks noGrp="1"/>
-          </p:cNvSpPr>
-          <p:nvPr>
-            <p:ph type="title"/>
-          </p:nvPr>
+          <p:cNvPr id="2" name="CasellaDiTesto 1">
+            <a:extLst>
+              <a:ext uri="{FF2B5EF4-FFF2-40B4-BE49-F238E27FC236}">
+                <a16:creationId xmlns:a16="http://schemas.microsoft.com/office/drawing/2014/main" id="{1396A286-5728-6DE9-33E8-4EEB394FDCE5}"/>
+              </a:ext>
+            </a:extLst>
+          </p:cNvPr>
+          <p:cNvSpPr txBox="1"/>
+          <p:nvPr/>
         </p:nvSpPr>
         <p:spPr>
           <a:xfrm>
-            <a:off x="1730000" y="525000"/>
-            <a:ext cx="9385200" cy="1218900"/>
+            <a:off x="2860272" y="363667"/>
+            <a:ext cx="6831106" cy="1077218"/>
           </a:xfrm>
+          <a:prstGeom prst="rect">
+            <a:avLst/>
+          </a:prstGeom>
+          <a:noFill/>
         </p:spPr>
         <p:txBody>
-          <a:bodyPr spcFirstLastPara="1" wrap="square" lIns="91425" tIns="45700" rIns="91425" bIns="45700" anchor="t" anchorCtr="0">
-            <a:normAutofit/>
+          <a:bodyPr wrap="square" rtlCol="0">
+            <a:spAutoFit/>
           </a:bodyPr>
           <a:lstStyle/>
           <a:p>
-            <a:pPr marL="0" lvl="0" indent="0" rtl="0">
-              <a:spcBef>
-                <a:spcPts val="0"/>
-              </a:spcBef>
-              <a:spcAft>
-                <a:spcPts val="0"/>
-              </a:spcAft>
-              <a:buClr>
-                <a:schemeClr val="dk1"/>
-              </a:buClr>
-              <a:buSzPts val="4400"/>
-              <a:buFont typeface="Play"/>
-              <a:buNone/>
-            </a:pPr>
             <a:r>
-              <a:rPr lang="it-IT" dirty="0" err="1"/>
-              <a:t>FUNZIONALIT</a:t>
+              <a:rPr lang="it-IT" sz="3200" dirty="0">
+                <a:solidFill>
+                  <a:schemeClr val="bg1"/>
+                </a:solidFill>
+              </a:rPr>
+              <a:t>Lambda </a:t>
             </a:r>
             <a:r>
-              <a:rPr lang="it-IT" cap="all" dirty="0" err="1"/>
-              <a:t>à</a:t>
+              <a:rPr lang="it-IT" sz="3200" dirty="0" err="1">
+                <a:solidFill>
+                  <a:schemeClr val="bg1"/>
+                </a:solidFill>
+              </a:rPr>
+              <a:t>Function</a:t>
             </a:r>
             <a:r>
-              <a:rPr lang="it-IT" dirty="0"/>
-              <a:t> </a:t>
+              <a:rPr lang="it-IT" sz="3200" dirty="0">
+                <a:solidFill>
+                  <a:schemeClr val="bg1"/>
+                </a:solidFill>
+              </a:rPr>
+              <a:t>(</a:t>
             </a:r>
             <a:r>
-              <a:rPr lang="it-IT" dirty="0" err="1"/>
-              <a:t>TEDxTOK</a:t>
+              <a:rPr lang="it-IT" sz="3200" dirty="0" err="1">
+                <a:solidFill>
+                  <a:schemeClr val="bg1"/>
+                </a:solidFill>
+              </a:rPr>
+              <a:t>TedxTok</a:t>
             </a:r>
-            <a:endParaRPr lang="it-IT" dirty="0"/>
+            <a:r>
+              <a:rPr lang="it-IT" sz="3200" dirty="0">
+                <a:solidFill>
+                  <a:schemeClr val="bg1"/>
+                </a:solidFill>
+              </a:rPr>
+              <a:t>): </a:t>
+            </a:r>
+            <a:r>
+              <a:rPr lang="it-IT" sz="3200" dirty="0" err="1">
+                <a:solidFill>
+                  <a:schemeClr val="bg1"/>
+                </a:solidFill>
+              </a:rPr>
+              <a:t>Get_Talk_List_By_Tags</a:t>
+            </a:r>
+            <a:endParaRPr lang="it-IT" sz="3200" dirty="0">
+              <a:solidFill>
+                <a:schemeClr val="bg1"/>
+              </a:solidFill>
+            </a:endParaRPr>
           </a:p>
         </p:txBody>
       </p:sp>
-      <p:sp>
-        <p:nvSpPr>
-          <p:cNvPr id="3" name="Segnaposto testo 2">
+      <p:pic>
+        <p:nvPicPr>
+          <p:cNvPr id="11" name="Immagine 10" descr="Immagine che contiene testo, schermata, Software multimediale, software&#10;&#10;Descrizione generata automaticamente">
             <a:extLst>
               <a:ext uri="{FF2B5EF4-FFF2-40B4-BE49-F238E27FC236}">
-                <a16:creationId xmlns:a16="http://schemas.microsoft.com/office/drawing/2014/main" id="{A7A34499-E4BC-5B6F-E11C-207910152B1A}"/>
+                <a16:creationId xmlns:a16="http://schemas.microsoft.com/office/drawing/2014/main" id="{11642305-2E1C-48B4-004A-44D7D304466B}"/>
               </a:ext>
             </a:extLst>
           </p:cNvPr>
-          <p:cNvSpPr>
-            <a:spLocks noGrp="1"/>
-          </p:cNvSpPr>
-          <p:nvPr>
-            <p:ph type="body" idx="1"/>
-          </p:nvPr>
+          <p:cNvPicPr>
+            <a:picLocks noChangeAspect="1"/>
+          </p:cNvPicPr>
+          <p:nvPr/>
+        </p:nvPicPr>
+        <p:blipFill rotWithShape="1">
+          <a:blip r:embed="rId3"/>
+          <a:srcRect r="42340"/>
+          <a:stretch/>
+        </p:blipFill>
+        <p:spPr>
+          <a:xfrm>
+            <a:off x="1014228" y="2218765"/>
+            <a:ext cx="5317725" cy="2784530"/>
+          </a:xfrm>
+          <a:prstGeom prst="rect">
+            <a:avLst/>
+          </a:prstGeom>
+        </p:spPr>
+      </p:pic>
+      <p:sp>
+        <p:nvSpPr>
+          <p:cNvPr id="14" name="CasellaDiTesto 13">
+            <a:extLst>
+              <a:ext uri="{FF2B5EF4-FFF2-40B4-BE49-F238E27FC236}">
+                <a16:creationId xmlns:a16="http://schemas.microsoft.com/office/drawing/2014/main" id="{747ACB7A-01E0-F116-1A02-07B5B267DB4C}"/>
+              </a:ext>
+            </a:extLst>
+          </p:cNvPr>
+          <p:cNvSpPr txBox="1"/>
+          <p:nvPr/>
         </p:nvSpPr>
-        <p:spPr/>
+        <p:spPr>
+          <a:xfrm>
+            <a:off x="6683188" y="2218765"/>
+            <a:ext cx="4397188" cy="2308324"/>
+          </a:xfrm>
+          <a:prstGeom prst="rect">
+            <a:avLst/>
+          </a:prstGeom>
+          <a:noFill/>
+        </p:spPr>
         <p:txBody>
-          <a:bodyPr/>
+          <a:bodyPr wrap="square" rtlCol="0">
+            <a:spAutoFit/>
+          </a:bodyPr>
           <a:lstStyle/>
           <a:p>
-            <a:endParaRPr lang="it-IT" dirty="0"/>
+            <a:r>
+              <a:rPr lang="it-IT" sz="1800" dirty="0">
+                <a:solidFill>
+                  <a:schemeClr val="bg1"/>
+                </a:solidFill>
+              </a:rPr>
+              <a:t>Utilizzando questo modello per la visualizzazione dei dati ,viene mostrato successivamente il codice della lambda </a:t>
+            </a:r>
+            <a:r>
+              <a:rPr lang="it-IT" sz="1800" dirty="0" err="1">
+                <a:solidFill>
+                  <a:schemeClr val="bg1"/>
+                </a:solidFill>
+              </a:rPr>
+              <a:t>function</a:t>
+            </a:r>
+            <a:r>
+              <a:rPr lang="it-IT" sz="1800" dirty="0">
+                <a:solidFill>
+                  <a:schemeClr val="bg1"/>
+                </a:solidFill>
+              </a:rPr>
+              <a:t>, disponibile attraverso questo link API: </a:t>
+            </a:r>
+          </a:p>
+          <a:p>
+            <a:r>
+              <a:rPr lang="it-IT" sz="1800" dirty="0">
+                <a:solidFill>
+                  <a:schemeClr val="bg1"/>
+                </a:solidFill>
+              </a:rPr>
+              <a:t>https://7qnrozfaf9.execute-api.us-east-1.amazonaws.com/default/Get_Talk_List_By_Tags</a:t>
+            </a:r>
           </a:p>
         </p:txBody>
       </p:sp>
@@ -16234,7 +17040,7 @@
 </p:sld>
 </file>
 
-<file path=ppt/slides/slide6.xml><?xml version="1.0" encoding="utf-8"?>
+<file path=ppt/slides/slide7.xml><?xml version="1.0" encoding="utf-8"?>
 <p:sld xmlns:a="http://schemas.openxmlformats.org/drawingml/2006/main" xmlns:r="http://schemas.openxmlformats.org/officeDocument/2006/relationships" xmlns:p="http://schemas.openxmlformats.org/presentationml/2006/main">
   <p:cSld>
     <p:spTree>
@@ -16251,31 +17057,64 @@
           <a:chExt cx="0" cy="0"/>
         </a:xfrm>
       </p:grpSpPr>
-      <p:sp>
-        <p:nvSpPr>
-          <p:cNvPr id="5" name="Titolo 4">
+      <p:pic>
+        <p:nvPicPr>
+          <p:cNvPr id="13" name="Immagine 12" descr="Immagine che contiene testo, schermata, software&#10;&#10;Descrizione generata automaticamente">
             <a:extLst>
               <a:ext uri="{FF2B5EF4-FFF2-40B4-BE49-F238E27FC236}">
-                <a16:creationId xmlns:a16="http://schemas.microsoft.com/office/drawing/2014/main" id="{5DA1CE11-95E2-A1A2-6893-2375D5367C4B}"/>
+                <a16:creationId xmlns:a16="http://schemas.microsoft.com/office/drawing/2014/main" id="{E7364FED-87BE-A391-9CD5-3EE84F657F96}"/>
               </a:ext>
             </a:extLst>
           </p:cNvPr>
-          <p:cNvSpPr>
-            <a:spLocks noGrp="1"/>
-          </p:cNvSpPr>
-          <p:nvPr>
-            <p:ph type="title"/>
-          </p:nvPr>
-        </p:nvSpPr>
-        <p:spPr/>
-        <p:txBody>
-          <a:bodyPr/>
-          <a:lstStyle/>
-          <a:p>
-            <a:endParaRPr lang="it-IT"/>
-          </a:p>
-        </p:txBody>
-      </p:sp>
+          <p:cNvPicPr>
+            <a:picLocks noChangeAspect="1"/>
+          </p:cNvPicPr>
+          <p:nvPr/>
+        </p:nvPicPr>
+        <p:blipFill rotWithShape="1">
+          <a:blip r:embed="rId3"/>
+          <a:srcRect r="31654"/>
+          <a:stretch/>
+        </p:blipFill>
+        <p:spPr>
+          <a:xfrm>
+            <a:off x="875200" y="409472"/>
+            <a:ext cx="4705330" cy="6039053"/>
+          </a:xfrm>
+          <a:prstGeom prst="rect">
+            <a:avLst/>
+          </a:prstGeom>
+        </p:spPr>
+      </p:pic>
+      <p:pic>
+        <p:nvPicPr>
+          <p:cNvPr id="9" name="Immagine 8" descr="Immagine che contiene testo, schermata, software&#10;&#10;Descrizione generata automaticamente">
+            <a:extLst>
+              <a:ext uri="{FF2B5EF4-FFF2-40B4-BE49-F238E27FC236}">
+                <a16:creationId xmlns:a16="http://schemas.microsoft.com/office/drawing/2014/main" id="{88186C97-8C41-D81C-45C1-5AAC4C142CBD}"/>
+              </a:ext>
+            </a:extLst>
+          </p:cNvPr>
+          <p:cNvPicPr>
+            <a:picLocks noChangeAspect="1"/>
+          </p:cNvPicPr>
+          <p:nvPr/>
+        </p:nvPicPr>
+        <p:blipFill rotWithShape="1">
+          <a:blip r:embed="rId4"/>
+          <a:srcRect t="1899" r="30299"/>
+          <a:stretch/>
+        </p:blipFill>
+        <p:spPr>
+          <a:xfrm>
+            <a:off x="6346319" y="409473"/>
+            <a:ext cx="5104952" cy="6039053"/>
+          </a:xfrm>
+          <a:prstGeom prst="rect">
+            <a:avLst/>
+          </a:prstGeom>
+        </p:spPr>
+      </p:pic>
     </p:spTree>
     <p:extLst>
       <p:ext uri="{BB962C8B-B14F-4D97-AF65-F5344CB8AC3E}">
@@ -16289,12 +17128,12 @@
 </p:sld>
 </file>
 
-<file path=ppt/slides/slide7.xml><?xml version="1.0" encoding="utf-8"?>
+<file path=ppt/slides/slide8.xml><?xml version="1.0" encoding="utf-8"?>
 <p:sld xmlns:a="http://schemas.openxmlformats.org/drawingml/2006/main" xmlns:r="http://schemas.openxmlformats.org/officeDocument/2006/relationships" xmlns:p="http://schemas.openxmlformats.org/presentationml/2006/main">
   <p:cSld>
     <p:spTree>
       <p:nvGrpSpPr>
-        <p:cNvPr id="1" name="Shape 184"/>
+        <p:cNvPr id="1" name="Shape 165"/>
         <p:cNvGrpSpPr/>
         <p:nvPr/>
       </p:nvGrpSpPr>
@@ -16306,7 +17145,264 @@
           <a:chExt cx="0" cy="0"/>
         </a:xfrm>
       </p:grpSpPr>
+      <p:sp>
+        <p:nvSpPr>
+          <p:cNvPr id="2" name="CasellaDiTesto 1">
+            <a:extLst>
+              <a:ext uri="{FF2B5EF4-FFF2-40B4-BE49-F238E27FC236}">
+                <a16:creationId xmlns:a16="http://schemas.microsoft.com/office/drawing/2014/main" id="{1396A286-5728-6DE9-33E8-4EEB394FDCE5}"/>
+              </a:ext>
+            </a:extLst>
+          </p:cNvPr>
+          <p:cNvSpPr txBox="1"/>
+          <p:nvPr/>
+        </p:nvSpPr>
+        <p:spPr>
+          <a:xfrm>
+            <a:off x="207811" y="1859340"/>
+            <a:ext cx="3799413" cy="2062103"/>
+          </a:xfrm>
+          <a:prstGeom prst="rect">
+            <a:avLst/>
+          </a:prstGeom>
+          <a:noFill/>
+        </p:spPr>
+        <p:txBody>
+          <a:bodyPr wrap="square" rtlCol="0">
+            <a:spAutoFit/>
+          </a:bodyPr>
+          <a:lstStyle/>
+          <a:p>
+            <a:r>
+              <a:rPr lang="it-IT" sz="3200" dirty="0">
+                <a:solidFill>
+                  <a:schemeClr val="bg1"/>
+                </a:solidFill>
+              </a:rPr>
+              <a:t>Lambda </a:t>
+            </a:r>
+            <a:r>
+              <a:rPr lang="it-IT" sz="3200" dirty="0" err="1">
+                <a:solidFill>
+                  <a:schemeClr val="bg1"/>
+                </a:solidFill>
+              </a:rPr>
+              <a:t>Function</a:t>
+            </a:r>
+            <a:r>
+              <a:rPr lang="it-IT" sz="3200" dirty="0">
+                <a:solidFill>
+                  <a:schemeClr val="bg1"/>
+                </a:solidFill>
+              </a:rPr>
+              <a:t>(</a:t>
+            </a:r>
+            <a:r>
+              <a:rPr lang="it-IT" sz="3200" dirty="0" err="1">
+                <a:solidFill>
+                  <a:schemeClr val="bg1"/>
+                </a:solidFill>
+              </a:rPr>
+              <a:t>TedxTok</a:t>
+            </a:r>
+            <a:r>
+              <a:rPr lang="it-IT" sz="3200" dirty="0">
+                <a:solidFill>
+                  <a:schemeClr val="bg1"/>
+                </a:solidFill>
+              </a:rPr>
+              <a:t>): </a:t>
+            </a:r>
+            <a:r>
+              <a:rPr lang="it-IT" sz="3200" dirty="0" err="1">
+                <a:solidFill>
+                  <a:schemeClr val="bg1"/>
+                </a:solidFill>
+              </a:rPr>
+              <a:t>Get_Talk_List_By_Tags</a:t>
+            </a:r>
+            <a:endParaRPr lang="it-IT" sz="3200" dirty="0">
+              <a:solidFill>
+                <a:schemeClr val="bg1"/>
+              </a:solidFill>
+            </a:endParaRPr>
+          </a:p>
+        </p:txBody>
+      </p:sp>
+      <p:pic>
+        <p:nvPicPr>
+          <p:cNvPr id="4" name="Immagine 3" descr="Immagine che contiene testo, Carattere, schermata, linea&#10;&#10;Descrizione generata automaticamente">
+            <a:extLst>
+              <a:ext uri="{FF2B5EF4-FFF2-40B4-BE49-F238E27FC236}">
+                <a16:creationId xmlns:a16="http://schemas.microsoft.com/office/drawing/2014/main" id="{BF9578A6-0CAB-8872-3057-66CC82814490}"/>
+              </a:ext>
+            </a:extLst>
+          </p:cNvPr>
+          <p:cNvPicPr>
+            <a:picLocks noChangeAspect="1"/>
+          </p:cNvPicPr>
+          <p:nvPr/>
+        </p:nvPicPr>
+        <p:blipFill>
+          <a:blip r:embed="rId3"/>
+          <a:stretch>
+            <a:fillRect/>
+          </a:stretch>
+        </p:blipFill>
+        <p:spPr>
+          <a:xfrm>
+            <a:off x="460417" y="4760805"/>
+            <a:ext cx="3441155" cy="940747"/>
+          </a:xfrm>
+          <a:prstGeom prst="rect">
+            <a:avLst/>
+          </a:prstGeom>
+        </p:spPr>
+      </p:pic>
+      <p:pic>
+        <p:nvPicPr>
+          <p:cNvPr id="6" name="Immagine 5" descr="Immagine che contiene testo, schermata, Carattere&#10;&#10;Descrizione generata automaticamente">
+            <a:extLst>
+              <a:ext uri="{FF2B5EF4-FFF2-40B4-BE49-F238E27FC236}">
+                <a16:creationId xmlns:a16="http://schemas.microsoft.com/office/drawing/2014/main" id="{D65728D6-3754-CC30-23C6-B958FFBFA6AD}"/>
+              </a:ext>
+            </a:extLst>
+          </p:cNvPr>
+          <p:cNvPicPr>
+            <a:picLocks noChangeAspect="1"/>
+          </p:cNvPicPr>
+          <p:nvPr/>
+        </p:nvPicPr>
+        <p:blipFill>
+          <a:blip r:embed="rId4"/>
+          <a:stretch>
+            <a:fillRect/>
+          </a:stretch>
+        </p:blipFill>
+        <p:spPr>
+          <a:xfrm>
+            <a:off x="4453493" y="686746"/>
+            <a:ext cx="7181074" cy="3031839"/>
+          </a:xfrm>
+          <a:prstGeom prst="rect">
+            <a:avLst/>
+          </a:prstGeom>
+        </p:spPr>
+      </p:pic>
+      <p:pic>
+        <p:nvPicPr>
+          <p:cNvPr id="8" name="Immagine 7" descr="Immagine che contiene testo, schermata, Carattere&#10;&#10;Descrizione generata automaticamente">
+            <a:extLst>
+              <a:ext uri="{FF2B5EF4-FFF2-40B4-BE49-F238E27FC236}">
+                <a16:creationId xmlns:a16="http://schemas.microsoft.com/office/drawing/2014/main" id="{C6DD14C3-6A85-B59C-82A1-9920B7E27A83}"/>
+              </a:ext>
+            </a:extLst>
+          </p:cNvPr>
+          <p:cNvPicPr>
+            <a:picLocks noChangeAspect="1"/>
+          </p:cNvPicPr>
+          <p:nvPr/>
+        </p:nvPicPr>
+        <p:blipFill>
+          <a:blip r:embed="rId5"/>
+          <a:stretch>
+            <a:fillRect/>
+          </a:stretch>
+        </p:blipFill>
+        <p:spPr>
+          <a:xfrm>
+            <a:off x="4453493" y="3718585"/>
+            <a:ext cx="7181074" cy="2599759"/>
+          </a:xfrm>
+          <a:prstGeom prst="rect">
+            <a:avLst/>
+          </a:prstGeom>
+        </p:spPr>
+      </p:pic>
+      <p:sp>
+        <p:nvSpPr>
+          <p:cNvPr id="9" name="CasellaDiTesto 8">
+            <a:extLst>
+              <a:ext uri="{FF2B5EF4-FFF2-40B4-BE49-F238E27FC236}">
+                <a16:creationId xmlns:a16="http://schemas.microsoft.com/office/drawing/2014/main" id="{3E119F94-4BC0-A3BB-FCBE-90FC54482C0E}"/>
+              </a:ext>
+            </a:extLst>
+          </p:cNvPr>
+          <p:cNvSpPr txBox="1"/>
+          <p:nvPr/>
+        </p:nvSpPr>
+        <p:spPr>
+          <a:xfrm>
+            <a:off x="460417" y="4156458"/>
+            <a:ext cx="1640541" cy="369332"/>
+          </a:xfrm>
+          <a:prstGeom prst="rect">
+            <a:avLst/>
+          </a:prstGeom>
+          <a:noFill/>
+        </p:spPr>
+        <p:txBody>
+          <a:bodyPr wrap="square" rtlCol="0">
+            <a:spAutoFit/>
+          </a:bodyPr>
+          <a:lstStyle/>
+          <a:p>
+            <a:r>
+              <a:rPr lang="it-IT" sz="1800" dirty="0">
+                <a:solidFill>
+                  <a:schemeClr val="bg1"/>
+                </a:solidFill>
+              </a:rPr>
+              <a:t>INPUT:</a:t>
+            </a:r>
+          </a:p>
+        </p:txBody>
+      </p:sp>
+      <p:sp>
+        <p:nvSpPr>
+          <p:cNvPr id="10" name="CasellaDiTesto 9">
+            <a:extLst>
+              <a:ext uri="{FF2B5EF4-FFF2-40B4-BE49-F238E27FC236}">
+                <a16:creationId xmlns:a16="http://schemas.microsoft.com/office/drawing/2014/main" id="{1D2F1AF4-6E8C-D2E9-A9E1-9B78B8D1DF7E}"/>
+              </a:ext>
+            </a:extLst>
+          </p:cNvPr>
+          <p:cNvSpPr txBox="1"/>
+          <p:nvPr/>
+        </p:nvSpPr>
+        <p:spPr>
+          <a:xfrm>
+            <a:off x="4453493" y="170324"/>
+            <a:ext cx="3087638" cy="369332"/>
+          </a:xfrm>
+          <a:prstGeom prst="rect">
+            <a:avLst/>
+          </a:prstGeom>
+          <a:noFill/>
+        </p:spPr>
+        <p:txBody>
+          <a:bodyPr wrap="square" rtlCol="0">
+            <a:spAutoFit/>
+          </a:bodyPr>
+          <a:lstStyle/>
+          <a:p>
+            <a:r>
+              <a:rPr lang="it-IT" sz="1800" dirty="0">
+                <a:solidFill>
+                  <a:schemeClr val="bg1"/>
+                </a:solidFill>
+              </a:rPr>
+              <a:t>OUTPUT:</a:t>
+            </a:r>
+          </a:p>
+        </p:txBody>
+      </p:sp>
     </p:spTree>
+    <p:extLst>
+      <p:ext uri="{BB962C8B-B14F-4D97-AF65-F5344CB8AC3E}">
+        <p14:creationId xmlns:p14="http://schemas.microsoft.com/office/powerpoint/2010/main" val="1119446600"/>
+      </p:ext>
+    </p:extLst>
   </p:cSld>
   <p:clrMapOvr>
     <a:masterClrMapping/>
@@ -16314,7 +17410,7 @@
 </p:sld>
 </file>
 
-<file path=ppt/slides/slide8.xml><?xml version="1.0" encoding="utf-8"?>
+<file path=ppt/slides/slide9.xml><?xml version="1.0" encoding="utf-8"?>
 <p:sld xmlns:a="http://schemas.openxmlformats.org/drawingml/2006/main" xmlns:r="http://schemas.openxmlformats.org/officeDocument/2006/relationships" xmlns:p="http://schemas.openxmlformats.org/presentationml/2006/main">
   <p:cSld>
     <p:spTree>
@@ -16576,7 +17672,7 @@
                 <a:cs typeface="Lato"/>
                 <a:sym typeface="Lato"/>
               </a:rPr>
-              <a:t>A</a:t>
+              <a:t>A.</a:t>
             </a:r>
           </a:p>
         </p:txBody>
@@ -16634,157 +17730,6 @@
           <a:xfrm>
             <a:off x="7518663" y="4357304"/>
             <a:ext cx="2429673" cy="1975686"/>
-          </a:xfrm>
-          <a:prstGeom prst="rect">
-            <a:avLst/>
-          </a:prstGeom>
-        </p:spPr>
-      </p:pic>
-    </p:spTree>
-  </p:cSld>
-  <p:clrMapOvr>
-    <a:masterClrMapping/>
-  </p:clrMapOvr>
-</p:sld>
-</file>
-
-<file path=ppt/slides/slide9.xml><?xml version="1.0" encoding="utf-8"?>
-<p:sld xmlns:a="http://schemas.openxmlformats.org/drawingml/2006/main" xmlns:r="http://schemas.openxmlformats.org/officeDocument/2006/relationships" xmlns:p="http://schemas.openxmlformats.org/presentationml/2006/main">
-  <p:cSld>
-    <p:spTree>
-      <p:nvGrpSpPr>
-        <p:cNvPr id="1" name="Shape 189"/>
-        <p:cNvGrpSpPr/>
-        <p:nvPr/>
-      </p:nvGrpSpPr>
-      <p:grpSpPr>
-        <a:xfrm>
-          <a:off x="0" y="0"/>
-          <a:ext cx="0" cy="0"/>
-          <a:chOff x="0" y="0"/>
-          <a:chExt cx="0" cy="0"/>
-        </a:xfrm>
-      </p:grpSpPr>
-      <p:sp>
-        <p:nvSpPr>
-          <p:cNvPr id="190" name="Google Shape;190;g2dae90a407d_1_10"/>
-          <p:cNvSpPr txBox="1">
-            <a:spLocks noGrp="1"/>
-          </p:cNvSpPr>
-          <p:nvPr>
-            <p:ph type="body" idx="1"/>
-          </p:nvPr>
-        </p:nvSpPr>
-        <p:spPr>
-          <a:xfrm>
-            <a:off x="3149182" y="4696874"/>
-            <a:ext cx="4887900" cy="723600"/>
-          </a:xfrm>
-          <a:prstGeom prst="rect">
-            <a:avLst/>
-          </a:prstGeom>
-          <a:noFill/>
-          <a:ln>
-            <a:noFill/>
-          </a:ln>
-        </p:spPr>
-        <p:txBody>
-          <a:bodyPr spcFirstLastPara="1" wrap="square" lIns="91425" tIns="45700" rIns="91425" bIns="45700" anchor="t" anchorCtr="0">
-            <a:normAutofit fontScale="92500" lnSpcReduction="20000"/>
-          </a:bodyPr>
-          <a:lstStyle/>
-          <a:p>
-            <a:pPr marL="0" lvl="0" indent="0" algn="l" rtl="0">
-              <a:lnSpc>
-                <a:spcPct val="90000"/>
-              </a:lnSpc>
-              <a:spcBef>
-                <a:spcPts val="1000"/>
-              </a:spcBef>
-              <a:spcAft>
-                <a:spcPts val="1600"/>
-              </a:spcAft>
-              <a:buSzPct val="69498"/>
-              <a:buNone/>
-            </a:pPr>
-            <a:r>
-              <a:rPr lang="it-IT" sz="2800" u="sng" dirty="0">
-                <a:solidFill>
-                  <a:schemeClr val="hlink"/>
-                </a:solidFill>
-                <a:hlinkClick r:id="rId3"/>
-              </a:rPr>
-              <a:t>Board</a:t>
-            </a:r>
-            <a:endParaRPr sz="2800" dirty="0"/>
-          </a:p>
-        </p:txBody>
-      </p:sp>
-      <p:sp>
-        <p:nvSpPr>
-          <p:cNvPr id="2" name="CasellaDiTesto 1">
-            <a:extLst>
-              <a:ext uri="{FF2B5EF4-FFF2-40B4-BE49-F238E27FC236}">
-                <a16:creationId xmlns:a16="http://schemas.microsoft.com/office/drawing/2014/main" id="{D8C7B831-EF17-11E6-E2A4-C2F43845C958}"/>
-              </a:ext>
-            </a:extLst>
-          </p:cNvPr>
-          <p:cNvSpPr txBox="1"/>
-          <p:nvPr/>
-        </p:nvSpPr>
-        <p:spPr>
-          <a:xfrm>
-            <a:off x="7403647" y="4775630"/>
-            <a:ext cx="4066694" cy="830997"/>
-          </a:xfrm>
-          <a:prstGeom prst="rect">
-            <a:avLst/>
-          </a:prstGeom>
-          <a:noFill/>
-        </p:spPr>
-        <p:txBody>
-          <a:bodyPr wrap="square" rtlCol="0">
-            <a:spAutoFit/>
-          </a:bodyPr>
-          <a:lstStyle/>
-          <a:p>
-            <a:r>
-              <a:rPr lang="it-IT" sz="2400" dirty="0">
-                <a:hlinkClick r:id="rId4"/>
-              </a:rPr>
-              <a:t>GitHub</a:t>
-            </a:r>
-            <a:endParaRPr lang="it-IT" sz="2400" dirty="0"/>
-          </a:p>
-          <a:p>
-            <a:endParaRPr lang="it-IT" sz="2400" dirty="0"/>
-          </a:p>
-        </p:txBody>
-      </p:sp>
-      <p:pic>
-        <p:nvPicPr>
-          <p:cNvPr id="4" name="Immagine 3" descr="Immagine che contiene Elementi grafici, Carattere, grafica, logo&#10;&#10;Descrizione generata automaticamente">
-            <a:extLst>
-              <a:ext uri="{FF2B5EF4-FFF2-40B4-BE49-F238E27FC236}">
-                <a16:creationId xmlns:a16="http://schemas.microsoft.com/office/drawing/2014/main" id="{0E02B7BB-040F-4CF9-0232-5E7BB344AE24}"/>
-              </a:ext>
-            </a:extLst>
-          </p:cNvPr>
-          <p:cNvPicPr>
-            <a:picLocks noChangeAspect="1"/>
-          </p:cNvPicPr>
-          <p:nvPr/>
-        </p:nvPicPr>
-        <p:blipFill>
-          <a:blip r:embed="rId5"/>
-          <a:stretch>
-            <a:fillRect/>
-          </a:stretch>
-        </p:blipFill>
-        <p:spPr>
-          <a:xfrm>
-            <a:off x="3184221" y="1293923"/>
-            <a:ext cx="5355703" cy="2994255"/>
           </a:xfrm>
           <a:prstGeom prst="rect">
             <a:avLst/>

</xml_diff>

<commit_message>
Update Presentazione TedxTok(parte 3).pptx
</commit_message>
<xml_diff>
--- a/Parte 3/Presentazione TedxTok(parte 3).pptx
+++ b/Parte 3/Presentazione TedxTok(parte 3).pptx
@@ -17373,7 +17373,7 @@
         <p:spPr>
           <a:xfrm>
             <a:off x="4453493" y="170324"/>
-            <a:ext cx="3087638" cy="369332"/>
+            <a:ext cx="4327436" cy="369332"/>
           </a:xfrm>
           <a:prstGeom prst="rect">
             <a:avLst/>
@@ -17392,7 +17392,23 @@
                   <a:schemeClr val="bg1"/>
                 </a:solidFill>
               </a:rPr>
-              <a:t>OUTPUT:</a:t>
+              <a:t>OUTPUT testato tramite </a:t>
+            </a:r>
+            <a:r>
+              <a:rPr lang="it-IT" sz="1800" dirty="0" err="1">
+                <a:solidFill>
+                  <a:schemeClr val="bg1"/>
+                </a:solidFill>
+              </a:rPr>
+              <a:t>postman</a:t>
+            </a:r>
+            <a:r>
+              <a:rPr lang="it-IT" sz="1800" dirty="0">
+                <a:solidFill>
+                  <a:schemeClr val="bg1"/>
+                </a:solidFill>
+              </a:rPr>
+              <a:t>:</a:t>
             </a:r>
           </a:p>
         </p:txBody>

</xml_diff>